<commit_message>
Solved 5.8(c). It's so hard...
</commit_message>
<xml_diff>
--- a/ch05/ex.5.5.pptx
+++ b/ch05/ex.5.5.pptx
@@ -7,14 +7,14 @@
   <p:sldIdLst>
     <p:sldId id="256" r:id="rId2"/>
   </p:sldIdLst>
-  <p:sldSz cx="6096000" cy="3435350"/>
+  <p:sldSz cx="4572000" cy="2286000"/>
   <p:notesSz cx="6858000" cy="9144000"/>
   <p:defaultTextStyle>
     <a:defPPr>
       <a:defRPr lang="ja-JP"/>
     </a:defPPr>
-    <a:lvl1pPr marL="0" algn="l" defTabSz="600632" rtl="0" eaLnBrk="1" latinLnBrk="0" hangingPunct="1">
-      <a:defRPr kumimoji="1" sz="1200" kern="1200">
+    <a:lvl1pPr marL="0" algn="l" defTabSz="449153" rtl="0" eaLnBrk="1" latinLnBrk="0" hangingPunct="1">
+      <a:defRPr kumimoji="1" sz="900" kern="1200">
         <a:solidFill>
           <a:schemeClr val="tx1"/>
         </a:solidFill>
@@ -23,8 +23,8 @@
         <a:cs typeface="+mn-cs"/>
       </a:defRPr>
     </a:lvl1pPr>
-    <a:lvl2pPr marL="300316" algn="l" defTabSz="600632" rtl="0" eaLnBrk="1" latinLnBrk="0" hangingPunct="1">
-      <a:defRPr kumimoji="1" sz="1200" kern="1200">
+    <a:lvl2pPr marL="224576" algn="l" defTabSz="449153" rtl="0" eaLnBrk="1" latinLnBrk="0" hangingPunct="1">
+      <a:defRPr kumimoji="1" sz="900" kern="1200">
         <a:solidFill>
           <a:schemeClr val="tx1"/>
         </a:solidFill>
@@ -33,8 +33,8 @@
         <a:cs typeface="+mn-cs"/>
       </a:defRPr>
     </a:lvl2pPr>
-    <a:lvl3pPr marL="600632" algn="l" defTabSz="600632" rtl="0" eaLnBrk="1" latinLnBrk="0" hangingPunct="1">
-      <a:defRPr kumimoji="1" sz="1200" kern="1200">
+    <a:lvl3pPr marL="449153" algn="l" defTabSz="449153" rtl="0" eaLnBrk="1" latinLnBrk="0" hangingPunct="1">
+      <a:defRPr kumimoji="1" sz="900" kern="1200">
         <a:solidFill>
           <a:schemeClr val="tx1"/>
         </a:solidFill>
@@ -43,8 +43,8 @@
         <a:cs typeface="+mn-cs"/>
       </a:defRPr>
     </a:lvl3pPr>
-    <a:lvl4pPr marL="900947" algn="l" defTabSz="600632" rtl="0" eaLnBrk="1" latinLnBrk="0" hangingPunct="1">
-      <a:defRPr kumimoji="1" sz="1200" kern="1200">
+    <a:lvl4pPr marL="673728" algn="l" defTabSz="449153" rtl="0" eaLnBrk="1" latinLnBrk="0" hangingPunct="1">
+      <a:defRPr kumimoji="1" sz="900" kern="1200">
         <a:solidFill>
           <a:schemeClr val="tx1"/>
         </a:solidFill>
@@ -53,8 +53,8 @@
         <a:cs typeface="+mn-cs"/>
       </a:defRPr>
     </a:lvl4pPr>
-    <a:lvl5pPr marL="1201263" algn="l" defTabSz="600632" rtl="0" eaLnBrk="1" latinLnBrk="0" hangingPunct="1">
-      <a:defRPr kumimoji="1" sz="1200" kern="1200">
+    <a:lvl5pPr marL="898304" algn="l" defTabSz="449153" rtl="0" eaLnBrk="1" latinLnBrk="0" hangingPunct="1">
+      <a:defRPr kumimoji="1" sz="900" kern="1200">
         <a:solidFill>
           <a:schemeClr val="tx1"/>
         </a:solidFill>
@@ -63,8 +63,8 @@
         <a:cs typeface="+mn-cs"/>
       </a:defRPr>
     </a:lvl5pPr>
-    <a:lvl6pPr marL="1501579" algn="l" defTabSz="600632" rtl="0" eaLnBrk="1" latinLnBrk="0" hangingPunct="1">
-      <a:defRPr kumimoji="1" sz="1200" kern="1200">
+    <a:lvl6pPr marL="1122881" algn="l" defTabSz="449153" rtl="0" eaLnBrk="1" latinLnBrk="0" hangingPunct="1">
+      <a:defRPr kumimoji="1" sz="900" kern="1200">
         <a:solidFill>
           <a:schemeClr val="tx1"/>
         </a:solidFill>
@@ -73,8 +73,8 @@
         <a:cs typeface="+mn-cs"/>
       </a:defRPr>
     </a:lvl6pPr>
-    <a:lvl7pPr marL="1801895" algn="l" defTabSz="600632" rtl="0" eaLnBrk="1" latinLnBrk="0" hangingPunct="1">
-      <a:defRPr kumimoji="1" sz="1200" kern="1200">
+    <a:lvl7pPr marL="1347457" algn="l" defTabSz="449153" rtl="0" eaLnBrk="1" latinLnBrk="0" hangingPunct="1">
+      <a:defRPr kumimoji="1" sz="900" kern="1200">
         <a:solidFill>
           <a:schemeClr val="tx1"/>
         </a:solidFill>
@@ -83,8 +83,8 @@
         <a:cs typeface="+mn-cs"/>
       </a:defRPr>
     </a:lvl7pPr>
-    <a:lvl8pPr marL="2102209" algn="l" defTabSz="600632" rtl="0" eaLnBrk="1" latinLnBrk="0" hangingPunct="1">
-      <a:defRPr kumimoji="1" sz="1200" kern="1200">
+    <a:lvl8pPr marL="1572032" algn="l" defTabSz="449153" rtl="0" eaLnBrk="1" latinLnBrk="0" hangingPunct="1">
+      <a:defRPr kumimoji="1" sz="900" kern="1200">
         <a:solidFill>
           <a:schemeClr val="tx1"/>
         </a:solidFill>
@@ -93,8 +93,8 @@
         <a:cs typeface="+mn-cs"/>
       </a:defRPr>
     </a:lvl8pPr>
-    <a:lvl9pPr marL="2402525" algn="l" defTabSz="600632" rtl="0" eaLnBrk="1" latinLnBrk="0" hangingPunct="1">
-      <a:defRPr kumimoji="1" sz="1200" kern="1200">
+    <a:lvl9pPr marL="1796608" algn="l" defTabSz="449153" rtl="0" eaLnBrk="1" latinLnBrk="0" hangingPunct="1">
+      <a:defRPr kumimoji="1" sz="900" kern="1200">
         <a:solidFill>
           <a:schemeClr val="tx1"/>
         </a:solidFill>
@@ -136,8 +136,8 @@
         </p:nvSpPr>
         <p:spPr>
           <a:xfrm>
-            <a:off x="457200" y="1067187"/>
-            <a:ext cx="5181601" cy="736374"/>
+            <a:off x="342901" y="710143"/>
+            <a:ext cx="3886201" cy="490009"/>
           </a:xfrm>
         </p:spPr>
         <p:txBody>
@@ -164,8 +164,8 @@
         </p:nvSpPr>
         <p:spPr>
           <a:xfrm>
-            <a:off x="914401" y="1946699"/>
-            <a:ext cx="4267200" cy="877922"/>
+            <a:off x="685801" y="1295401"/>
+            <a:ext cx="3200400" cy="584199"/>
           </a:xfrm>
         </p:spPr>
         <p:txBody>
@@ -181,7 +181,7 @@
                 </a:solidFill>
               </a:defRPr>
             </a:lvl1pPr>
-            <a:lvl2pPr marL="300316" indent="0" algn="ctr">
+            <a:lvl2pPr marL="224576" indent="0" algn="ctr">
               <a:buNone/>
               <a:defRPr>
                 <a:solidFill>
@@ -191,7 +191,7 @@
                 </a:solidFill>
               </a:defRPr>
             </a:lvl2pPr>
-            <a:lvl3pPr marL="600632" indent="0" algn="ctr">
+            <a:lvl3pPr marL="449153" indent="0" algn="ctr">
               <a:buNone/>
               <a:defRPr>
                 <a:solidFill>
@@ -201,7 +201,7 @@
                 </a:solidFill>
               </a:defRPr>
             </a:lvl3pPr>
-            <a:lvl4pPr marL="900947" indent="0" algn="ctr">
+            <a:lvl4pPr marL="673728" indent="0" algn="ctr">
               <a:buNone/>
               <a:defRPr>
                 <a:solidFill>
@@ -211,7 +211,7 @@
                 </a:solidFill>
               </a:defRPr>
             </a:lvl4pPr>
-            <a:lvl5pPr marL="1201263" indent="0" algn="ctr">
+            <a:lvl5pPr marL="898304" indent="0" algn="ctr">
               <a:buNone/>
               <a:defRPr>
                 <a:solidFill>
@@ -221,7 +221,7 @@
                 </a:solidFill>
               </a:defRPr>
             </a:lvl5pPr>
-            <a:lvl6pPr marL="1501579" indent="0" algn="ctr">
+            <a:lvl6pPr marL="1122881" indent="0" algn="ctr">
               <a:buNone/>
               <a:defRPr>
                 <a:solidFill>
@@ -231,7 +231,7 @@
                 </a:solidFill>
               </a:defRPr>
             </a:lvl6pPr>
-            <a:lvl7pPr marL="1801895" indent="0" algn="ctr">
+            <a:lvl7pPr marL="1347457" indent="0" algn="ctr">
               <a:buNone/>
               <a:defRPr>
                 <a:solidFill>
@@ -241,7 +241,7 @@
                 </a:solidFill>
               </a:defRPr>
             </a:lvl7pPr>
-            <a:lvl8pPr marL="2102209" indent="0" algn="ctr">
+            <a:lvl8pPr marL="1572032" indent="0" algn="ctr">
               <a:buNone/>
               <a:defRPr>
                 <a:solidFill>
@@ -251,7 +251,7 @@
                 </a:solidFill>
               </a:defRPr>
             </a:lvl8pPr>
-            <a:lvl9pPr marL="2402525" indent="0" algn="ctr">
+            <a:lvl9pPr marL="1796608" indent="0" algn="ctr">
               <a:buNone/>
               <a:defRPr>
                 <a:solidFill>
@@ -288,7 +288,7 @@
           <a:p>
             <a:fld id="{5D78CD70-2F04-42EE-8C6B-782007D6293F}" type="datetimeFigureOut">
               <a:rPr kumimoji="1" lang="ja-JP" altLang="en-US" smtClean="0"/>
-              <a:t>2017/8/4</a:t>
+              <a:t>2017/8/12</a:t>
             </a:fld>
             <a:endParaRPr kumimoji="1" lang="ja-JP" altLang="en-US"/>
           </a:p>
@@ -490,7 +490,7 @@
           <a:p>
             <a:fld id="{5D78CD70-2F04-42EE-8C6B-782007D6293F}" type="datetimeFigureOut">
               <a:rPr kumimoji="1" lang="ja-JP" altLang="en-US" smtClean="0"/>
-              <a:t>2017/8/4</a:t>
+              <a:t>2017/8/12</a:t>
             </a:fld>
             <a:endParaRPr kumimoji="1" lang="ja-JP" altLang="en-US"/>
           </a:p>
@@ -580,8 +580,8 @@
         </p:nvSpPr>
         <p:spPr>
           <a:xfrm>
-            <a:off x="4419601" y="137574"/>
-            <a:ext cx="1371599" cy="2931180"/>
+            <a:off x="3314702" y="91546"/>
+            <a:ext cx="1028699" cy="1950508"/>
           </a:xfrm>
         </p:spPr>
         <p:txBody>
@@ -608,8 +608,8 @@
         </p:nvSpPr>
         <p:spPr>
           <a:xfrm>
-            <a:off x="304803" y="137574"/>
-            <a:ext cx="4013199" cy="2931180"/>
+            <a:off x="228604" y="91546"/>
+            <a:ext cx="3009899" cy="1950508"/>
           </a:xfrm>
         </p:spPr>
         <p:txBody>
@@ -702,7 +702,7 @@
           <a:p>
             <a:fld id="{5D78CD70-2F04-42EE-8C6B-782007D6293F}" type="datetimeFigureOut">
               <a:rPr kumimoji="1" lang="ja-JP" altLang="en-US" smtClean="0"/>
-              <a:t>2017/8/4</a:t>
+              <a:t>2017/8/12</a:t>
             </a:fld>
             <a:endParaRPr kumimoji="1" lang="ja-JP" altLang="en-US"/>
           </a:p>
@@ -904,7 +904,7 @@
           <a:p>
             <a:fld id="{5D78CD70-2F04-42EE-8C6B-782007D6293F}" type="datetimeFigureOut">
               <a:rPr kumimoji="1" lang="ja-JP" altLang="en-US" smtClean="0"/>
-              <a:t>2017/8/4</a:t>
+              <a:t>2017/8/12</a:t>
             </a:fld>
             <a:endParaRPr kumimoji="1" lang="ja-JP" altLang="en-US"/>
           </a:p>
@@ -994,15 +994,15 @@
         </p:nvSpPr>
         <p:spPr>
           <a:xfrm>
-            <a:off x="481540" y="2207533"/>
-            <a:ext cx="5181601" cy="682298"/>
+            <a:off x="361156" y="1468969"/>
+            <a:ext cx="3886201" cy="454025"/>
           </a:xfrm>
         </p:spPr>
         <p:txBody>
           <a:bodyPr anchor="t"/>
           <a:lstStyle>
             <a:lvl1pPr algn="l">
-              <a:defRPr sz="2600" b="1" cap="all"/>
+              <a:defRPr sz="1900" b="1" cap="all"/>
             </a:lvl1pPr>
           </a:lstStyle>
           <a:p>
@@ -1026,8 +1026,8 @@
         </p:nvSpPr>
         <p:spPr>
           <a:xfrm>
-            <a:off x="481540" y="1456049"/>
-            <a:ext cx="5181601" cy="751482"/>
+            <a:off x="361156" y="968906"/>
+            <a:ext cx="3886201" cy="500062"/>
           </a:xfrm>
         </p:spPr>
         <p:txBody>
@@ -1035,7 +1035,7 @@
           <a:lstStyle>
             <a:lvl1pPr marL="0" indent="0">
               <a:buNone/>
-              <a:defRPr sz="1400">
+              <a:defRPr sz="1000">
                 <a:solidFill>
                   <a:schemeClr val="tx1">
                     <a:tint val="75000"/>
@@ -1043,9 +1043,9 @@
                 </a:solidFill>
               </a:defRPr>
             </a:lvl1pPr>
-            <a:lvl2pPr marL="300316" indent="0">
-              <a:buNone/>
-              <a:defRPr sz="1200">
+            <a:lvl2pPr marL="224576" indent="0">
+              <a:buNone/>
+              <a:defRPr sz="900">
                 <a:solidFill>
                   <a:schemeClr val="tx1">
                     <a:tint val="75000"/>
@@ -1053,9 +1053,9 @@
                 </a:solidFill>
               </a:defRPr>
             </a:lvl2pPr>
-            <a:lvl3pPr marL="600632" indent="0">
-              <a:buNone/>
-              <a:defRPr sz="1000">
+            <a:lvl3pPr marL="449153" indent="0">
+              <a:buNone/>
+              <a:defRPr sz="700">
                 <a:solidFill>
                   <a:schemeClr val="tx1">
                     <a:tint val="75000"/>
@@ -1063,9 +1063,9 @@
                 </a:solidFill>
               </a:defRPr>
             </a:lvl3pPr>
-            <a:lvl4pPr marL="900947" indent="0">
-              <a:buNone/>
-              <a:defRPr sz="1000">
+            <a:lvl4pPr marL="673728" indent="0">
+              <a:buNone/>
+              <a:defRPr sz="700">
                 <a:solidFill>
                   <a:schemeClr val="tx1">
                     <a:tint val="75000"/>
@@ -1073,9 +1073,9 @@
                 </a:solidFill>
               </a:defRPr>
             </a:lvl4pPr>
-            <a:lvl5pPr marL="1201263" indent="0">
-              <a:buNone/>
-              <a:defRPr sz="1000">
+            <a:lvl5pPr marL="898304" indent="0">
+              <a:buNone/>
+              <a:defRPr sz="700">
                 <a:solidFill>
                   <a:schemeClr val="tx1">
                     <a:tint val="75000"/>
@@ -1083,9 +1083,9 @@
                 </a:solidFill>
               </a:defRPr>
             </a:lvl5pPr>
-            <a:lvl6pPr marL="1501579" indent="0">
-              <a:buNone/>
-              <a:defRPr sz="1000">
+            <a:lvl6pPr marL="1122881" indent="0">
+              <a:buNone/>
+              <a:defRPr sz="700">
                 <a:solidFill>
                   <a:schemeClr val="tx1">
                     <a:tint val="75000"/>
@@ -1093,9 +1093,9 @@
                 </a:solidFill>
               </a:defRPr>
             </a:lvl6pPr>
-            <a:lvl7pPr marL="1801895" indent="0">
-              <a:buNone/>
-              <a:defRPr sz="1000">
+            <a:lvl7pPr marL="1347457" indent="0">
+              <a:buNone/>
+              <a:defRPr sz="700">
                 <a:solidFill>
                   <a:schemeClr val="tx1">
                     <a:tint val="75000"/>
@@ -1103,9 +1103,9 @@
                 </a:solidFill>
               </a:defRPr>
             </a:lvl7pPr>
-            <a:lvl8pPr marL="2102209" indent="0">
-              <a:buNone/>
-              <a:defRPr sz="1000">
+            <a:lvl8pPr marL="1572032" indent="0">
+              <a:buNone/>
+              <a:defRPr sz="700">
                 <a:solidFill>
                   <a:schemeClr val="tx1">
                     <a:tint val="75000"/>
@@ -1113,9 +1113,9 @@
                 </a:solidFill>
               </a:defRPr>
             </a:lvl8pPr>
-            <a:lvl9pPr marL="2402525" indent="0">
-              <a:buNone/>
-              <a:defRPr sz="1000">
+            <a:lvl9pPr marL="1796608" indent="0">
+              <a:buNone/>
+              <a:defRPr sz="700">
                 <a:solidFill>
                   <a:schemeClr val="tx1">
                     <a:tint val="75000"/>
@@ -1150,7 +1150,7 @@
           <a:p>
             <a:fld id="{5D78CD70-2F04-42EE-8C6B-782007D6293F}" type="datetimeFigureOut">
               <a:rPr kumimoji="1" lang="ja-JP" altLang="en-US" smtClean="0"/>
-              <a:t>2017/8/4</a:t>
+              <a:t>2017/8/12</a:t>
             </a:fld>
             <a:endParaRPr kumimoji="1" lang="ja-JP" altLang="en-US"/>
           </a:p>
@@ -1263,39 +1263,39 @@
         </p:nvSpPr>
         <p:spPr>
           <a:xfrm>
-            <a:off x="304803" y="801582"/>
-            <a:ext cx="2692399" cy="2267172"/>
+            <a:off x="228604" y="533401"/>
+            <a:ext cx="2019299" cy="1508654"/>
           </a:xfrm>
         </p:spPr>
         <p:txBody>
           <a:bodyPr/>
           <a:lstStyle>
             <a:lvl1pPr>
-              <a:defRPr sz="1800"/>
+              <a:defRPr sz="1300"/>
             </a:lvl1pPr>
             <a:lvl2pPr>
-              <a:defRPr sz="1600"/>
+              <a:defRPr sz="1200"/>
             </a:lvl2pPr>
             <a:lvl3pPr>
-              <a:defRPr sz="1400"/>
+              <a:defRPr sz="1000"/>
             </a:lvl3pPr>
             <a:lvl4pPr>
-              <a:defRPr sz="1200"/>
+              <a:defRPr sz="900"/>
             </a:lvl4pPr>
             <a:lvl5pPr>
-              <a:defRPr sz="1200"/>
+              <a:defRPr sz="900"/>
             </a:lvl5pPr>
             <a:lvl6pPr>
-              <a:defRPr sz="1200"/>
+              <a:defRPr sz="900"/>
             </a:lvl6pPr>
             <a:lvl7pPr>
-              <a:defRPr sz="1200"/>
+              <a:defRPr sz="900"/>
             </a:lvl7pPr>
             <a:lvl8pPr>
-              <a:defRPr sz="1200"/>
+              <a:defRPr sz="900"/>
             </a:lvl8pPr>
             <a:lvl9pPr>
-              <a:defRPr sz="1200"/>
+              <a:defRPr sz="900"/>
             </a:lvl9pPr>
           </a:lstStyle>
           <a:p>
@@ -1380,39 +1380,39 @@
         </p:nvSpPr>
         <p:spPr>
           <a:xfrm>
-            <a:off x="3098801" y="801582"/>
-            <a:ext cx="2692399" cy="2267172"/>
+            <a:off x="2324101" y="533401"/>
+            <a:ext cx="2019299" cy="1508654"/>
           </a:xfrm>
         </p:spPr>
         <p:txBody>
           <a:bodyPr/>
           <a:lstStyle>
             <a:lvl1pPr>
-              <a:defRPr sz="1800"/>
+              <a:defRPr sz="1300"/>
             </a:lvl1pPr>
             <a:lvl2pPr>
-              <a:defRPr sz="1600"/>
+              <a:defRPr sz="1200"/>
             </a:lvl2pPr>
             <a:lvl3pPr>
-              <a:defRPr sz="1400"/>
+              <a:defRPr sz="1000"/>
             </a:lvl3pPr>
             <a:lvl4pPr>
-              <a:defRPr sz="1200"/>
+              <a:defRPr sz="900"/>
             </a:lvl4pPr>
             <a:lvl5pPr>
-              <a:defRPr sz="1200"/>
+              <a:defRPr sz="900"/>
             </a:lvl5pPr>
             <a:lvl6pPr>
-              <a:defRPr sz="1200"/>
+              <a:defRPr sz="900"/>
             </a:lvl6pPr>
             <a:lvl7pPr>
-              <a:defRPr sz="1200"/>
+              <a:defRPr sz="900"/>
             </a:lvl7pPr>
             <a:lvl8pPr>
-              <a:defRPr sz="1200"/>
+              <a:defRPr sz="900"/>
             </a:lvl8pPr>
             <a:lvl9pPr>
-              <a:defRPr sz="1200"/>
+              <a:defRPr sz="900"/>
             </a:lvl9pPr>
           </a:lstStyle>
           <a:p>
@@ -1502,7 +1502,7 @@
           <a:p>
             <a:fld id="{5D78CD70-2F04-42EE-8C6B-782007D6293F}" type="datetimeFigureOut">
               <a:rPr kumimoji="1" lang="ja-JP" altLang="en-US" smtClean="0"/>
-              <a:t>2017/8/4</a:t>
+              <a:t>2017/8/12</a:t>
             </a:fld>
             <a:endParaRPr kumimoji="1" lang="ja-JP" altLang="en-US"/>
           </a:p>
@@ -1619,8 +1619,8 @@
         </p:nvSpPr>
         <p:spPr>
           <a:xfrm>
-            <a:off x="304800" y="768979"/>
-            <a:ext cx="2693459" cy="320474"/>
+            <a:off x="228601" y="511705"/>
+            <a:ext cx="2020094" cy="213254"/>
           </a:xfrm>
         </p:spPr>
         <p:txBody>
@@ -1628,39 +1628,39 @@
           <a:lstStyle>
             <a:lvl1pPr marL="0" indent="0">
               <a:buNone/>
-              <a:defRPr sz="1600" b="1"/>
+              <a:defRPr sz="1200" b="1"/>
             </a:lvl1pPr>
-            <a:lvl2pPr marL="300316" indent="0">
-              <a:buNone/>
-              <a:defRPr sz="1400" b="1"/>
+            <a:lvl2pPr marL="224576" indent="0">
+              <a:buNone/>
+              <a:defRPr sz="1000" b="1"/>
             </a:lvl2pPr>
-            <a:lvl3pPr marL="600632" indent="0">
-              <a:buNone/>
-              <a:defRPr sz="1200" b="1"/>
+            <a:lvl3pPr marL="449153" indent="0">
+              <a:buNone/>
+              <a:defRPr sz="900" b="1"/>
             </a:lvl3pPr>
-            <a:lvl4pPr marL="900947" indent="0">
-              <a:buNone/>
-              <a:defRPr sz="1000" b="1"/>
+            <a:lvl4pPr marL="673728" indent="0">
+              <a:buNone/>
+              <a:defRPr sz="700" b="1"/>
             </a:lvl4pPr>
-            <a:lvl5pPr marL="1201263" indent="0">
-              <a:buNone/>
-              <a:defRPr sz="1000" b="1"/>
+            <a:lvl5pPr marL="898304" indent="0">
+              <a:buNone/>
+              <a:defRPr sz="700" b="1"/>
             </a:lvl5pPr>
-            <a:lvl6pPr marL="1501579" indent="0">
-              <a:buNone/>
-              <a:defRPr sz="1000" b="1"/>
+            <a:lvl6pPr marL="1122881" indent="0">
+              <a:buNone/>
+              <a:defRPr sz="700" b="1"/>
             </a:lvl6pPr>
-            <a:lvl7pPr marL="1801895" indent="0">
-              <a:buNone/>
-              <a:defRPr sz="1000" b="1"/>
+            <a:lvl7pPr marL="1347457" indent="0">
+              <a:buNone/>
+              <a:defRPr sz="700" b="1"/>
             </a:lvl7pPr>
-            <a:lvl8pPr marL="2102209" indent="0">
-              <a:buNone/>
-              <a:defRPr sz="1000" b="1"/>
+            <a:lvl8pPr marL="1572032" indent="0">
+              <a:buNone/>
+              <a:defRPr sz="700" b="1"/>
             </a:lvl8pPr>
-            <a:lvl9pPr marL="2402525" indent="0">
-              <a:buNone/>
-              <a:defRPr sz="1000" b="1"/>
+            <a:lvl9pPr marL="1796608" indent="0">
+              <a:buNone/>
+              <a:defRPr sz="700" b="1"/>
             </a:lvl9pPr>
           </a:lstStyle>
           <a:p>
@@ -1684,39 +1684,39 @@
         </p:nvSpPr>
         <p:spPr>
           <a:xfrm>
-            <a:off x="304800" y="1089453"/>
-            <a:ext cx="2693459" cy="1979302"/>
+            <a:off x="228601" y="724959"/>
+            <a:ext cx="2020094" cy="1317096"/>
           </a:xfrm>
         </p:spPr>
         <p:txBody>
           <a:bodyPr/>
           <a:lstStyle>
             <a:lvl1pPr>
-              <a:defRPr sz="1600"/>
+              <a:defRPr sz="1200"/>
             </a:lvl1pPr>
             <a:lvl2pPr>
-              <a:defRPr sz="1400"/>
+              <a:defRPr sz="1000"/>
             </a:lvl2pPr>
             <a:lvl3pPr>
-              <a:defRPr sz="1200"/>
+              <a:defRPr sz="900"/>
             </a:lvl3pPr>
             <a:lvl4pPr>
-              <a:defRPr sz="1000"/>
+              <a:defRPr sz="700"/>
             </a:lvl4pPr>
             <a:lvl5pPr>
-              <a:defRPr sz="1000"/>
+              <a:defRPr sz="700"/>
             </a:lvl5pPr>
             <a:lvl6pPr>
-              <a:defRPr sz="1000"/>
+              <a:defRPr sz="700"/>
             </a:lvl6pPr>
             <a:lvl7pPr>
-              <a:defRPr sz="1000"/>
+              <a:defRPr sz="700"/>
             </a:lvl7pPr>
             <a:lvl8pPr>
-              <a:defRPr sz="1000"/>
+              <a:defRPr sz="700"/>
             </a:lvl8pPr>
             <a:lvl9pPr>
-              <a:defRPr sz="1000"/>
+              <a:defRPr sz="700"/>
             </a:lvl9pPr>
           </a:lstStyle>
           <a:p>
@@ -1801,8 +1801,8 @@
         </p:nvSpPr>
         <p:spPr>
           <a:xfrm>
-            <a:off x="3096685" y="768979"/>
-            <a:ext cx="2694516" cy="320474"/>
+            <a:off x="2322515" y="511705"/>
+            <a:ext cx="2020887" cy="213254"/>
           </a:xfrm>
         </p:spPr>
         <p:txBody>
@@ -1810,39 +1810,39 @@
           <a:lstStyle>
             <a:lvl1pPr marL="0" indent="0">
               <a:buNone/>
-              <a:defRPr sz="1600" b="1"/>
+              <a:defRPr sz="1200" b="1"/>
             </a:lvl1pPr>
-            <a:lvl2pPr marL="300316" indent="0">
-              <a:buNone/>
-              <a:defRPr sz="1400" b="1"/>
+            <a:lvl2pPr marL="224576" indent="0">
+              <a:buNone/>
+              <a:defRPr sz="1000" b="1"/>
             </a:lvl2pPr>
-            <a:lvl3pPr marL="600632" indent="0">
-              <a:buNone/>
-              <a:defRPr sz="1200" b="1"/>
+            <a:lvl3pPr marL="449153" indent="0">
+              <a:buNone/>
+              <a:defRPr sz="900" b="1"/>
             </a:lvl3pPr>
-            <a:lvl4pPr marL="900947" indent="0">
-              <a:buNone/>
-              <a:defRPr sz="1000" b="1"/>
+            <a:lvl4pPr marL="673728" indent="0">
+              <a:buNone/>
+              <a:defRPr sz="700" b="1"/>
             </a:lvl4pPr>
-            <a:lvl5pPr marL="1201263" indent="0">
-              <a:buNone/>
-              <a:defRPr sz="1000" b="1"/>
+            <a:lvl5pPr marL="898304" indent="0">
+              <a:buNone/>
+              <a:defRPr sz="700" b="1"/>
             </a:lvl5pPr>
-            <a:lvl6pPr marL="1501579" indent="0">
-              <a:buNone/>
-              <a:defRPr sz="1000" b="1"/>
+            <a:lvl6pPr marL="1122881" indent="0">
+              <a:buNone/>
+              <a:defRPr sz="700" b="1"/>
             </a:lvl6pPr>
-            <a:lvl7pPr marL="1801895" indent="0">
-              <a:buNone/>
-              <a:defRPr sz="1000" b="1"/>
+            <a:lvl7pPr marL="1347457" indent="0">
+              <a:buNone/>
+              <a:defRPr sz="700" b="1"/>
             </a:lvl7pPr>
-            <a:lvl8pPr marL="2102209" indent="0">
-              <a:buNone/>
-              <a:defRPr sz="1000" b="1"/>
+            <a:lvl8pPr marL="1572032" indent="0">
+              <a:buNone/>
+              <a:defRPr sz="700" b="1"/>
             </a:lvl8pPr>
-            <a:lvl9pPr marL="2402525" indent="0">
-              <a:buNone/>
-              <a:defRPr sz="1000" b="1"/>
+            <a:lvl9pPr marL="1796608" indent="0">
+              <a:buNone/>
+              <a:defRPr sz="700" b="1"/>
             </a:lvl9pPr>
           </a:lstStyle>
           <a:p>
@@ -1866,39 +1866,39 @@
         </p:nvSpPr>
         <p:spPr>
           <a:xfrm>
-            <a:off x="3096685" y="1089453"/>
-            <a:ext cx="2694516" cy="1979302"/>
+            <a:off x="2322515" y="724959"/>
+            <a:ext cx="2020887" cy="1317096"/>
           </a:xfrm>
         </p:spPr>
         <p:txBody>
           <a:bodyPr/>
           <a:lstStyle>
             <a:lvl1pPr>
-              <a:defRPr sz="1600"/>
+              <a:defRPr sz="1200"/>
             </a:lvl1pPr>
             <a:lvl2pPr>
-              <a:defRPr sz="1400"/>
+              <a:defRPr sz="1000"/>
             </a:lvl2pPr>
             <a:lvl3pPr>
-              <a:defRPr sz="1200"/>
+              <a:defRPr sz="900"/>
             </a:lvl3pPr>
             <a:lvl4pPr>
-              <a:defRPr sz="1000"/>
+              <a:defRPr sz="700"/>
             </a:lvl4pPr>
             <a:lvl5pPr>
-              <a:defRPr sz="1000"/>
+              <a:defRPr sz="700"/>
             </a:lvl5pPr>
             <a:lvl6pPr>
-              <a:defRPr sz="1000"/>
+              <a:defRPr sz="700"/>
             </a:lvl6pPr>
             <a:lvl7pPr>
-              <a:defRPr sz="1000"/>
+              <a:defRPr sz="700"/>
             </a:lvl7pPr>
             <a:lvl8pPr>
-              <a:defRPr sz="1000"/>
+              <a:defRPr sz="700"/>
             </a:lvl8pPr>
             <a:lvl9pPr>
-              <a:defRPr sz="1000"/>
+              <a:defRPr sz="700"/>
             </a:lvl9pPr>
           </a:lstStyle>
           <a:p>
@@ -1988,7 +1988,7 @@
           <a:p>
             <a:fld id="{5D78CD70-2F04-42EE-8C6B-782007D6293F}" type="datetimeFigureOut">
               <a:rPr kumimoji="1" lang="ja-JP" altLang="en-US" smtClean="0"/>
-              <a:t>2017/8/4</a:t>
+              <a:t>2017/8/12</a:t>
             </a:fld>
             <a:endParaRPr kumimoji="1" lang="ja-JP" altLang="en-US"/>
           </a:p>
@@ -2106,7 +2106,7 @@
           <a:p>
             <a:fld id="{5D78CD70-2F04-42EE-8C6B-782007D6293F}" type="datetimeFigureOut">
               <a:rPr kumimoji="1" lang="ja-JP" altLang="en-US" smtClean="0"/>
-              <a:t>2017/8/4</a:t>
+              <a:t>2017/8/12</a:t>
             </a:fld>
             <a:endParaRPr kumimoji="1" lang="ja-JP" altLang="en-US"/>
           </a:p>
@@ -2201,7 +2201,7 @@
           <a:p>
             <a:fld id="{5D78CD70-2F04-42EE-8C6B-782007D6293F}" type="datetimeFigureOut">
               <a:rPr kumimoji="1" lang="ja-JP" altLang="en-US" smtClean="0"/>
-              <a:t>2017/8/4</a:t>
+              <a:t>2017/8/12</a:t>
             </a:fld>
             <a:endParaRPr kumimoji="1" lang="ja-JP" altLang="en-US"/>
           </a:p>
@@ -2298,15 +2298,15 @@
         </p:nvSpPr>
         <p:spPr>
           <a:xfrm>
-            <a:off x="304802" y="136779"/>
-            <a:ext cx="2005541" cy="582102"/>
+            <a:off x="228602" y="91017"/>
+            <a:ext cx="1504156" cy="387351"/>
           </a:xfrm>
         </p:spPr>
         <p:txBody>
           <a:bodyPr anchor="b"/>
           <a:lstStyle>
             <a:lvl1pPr algn="l">
-              <a:defRPr sz="1400" b="1"/>
+              <a:defRPr sz="1000" b="1"/>
             </a:lvl1pPr>
           </a:lstStyle>
           <a:p>
@@ -2330,39 +2330,39 @@
         </p:nvSpPr>
         <p:spPr>
           <a:xfrm>
-            <a:off x="2383367" y="136778"/>
-            <a:ext cx="3407832" cy="2931976"/>
+            <a:off x="1787525" y="91017"/>
+            <a:ext cx="2555874" cy="1951037"/>
           </a:xfrm>
         </p:spPr>
         <p:txBody>
           <a:bodyPr/>
           <a:lstStyle>
             <a:lvl1pPr>
-              <a:defRPr sz="2200"/>
+              <a:defRPr sz="1600"/>
             </a:lvl1pPr>
             <a:lvl2pPr>
-              <a:defRPr sz="1800"/>
+              <a:defRPr sz="1300"/>
             </a:lvl2pPr>
             <a:lvl3pPr>
-              <a:defRPr sz="1600"/>
+              <a:defRPr sz="1200"/>
             </a:lvl3pPr>
             <a:lvl4pPr>
-              <a:defRPr sz="1400"/>
+              <a:defRPr sz="1000"/>
             </a:lvl4pPr>
             <a:lvl5pPr>
-              <a:defRPr sz="1400"/>
+              <a:defRPr sz="1000"/>
             </a:lvl5pPr>
             <a:lvl6pPr>
-              <a:defRPr sz="1400"/>
+              <a:defRPr sz="1000"/>
             </a:lvl6pPr>
             <a:lvl7pPr>
-              <a:defRPr sz="1400"/>
+              <a:defRPr sz="1000"/>
             </a:lvl7pPr>
             <a:lvl8pPr>
-              <a:defRPr sz="1400"/>
+              <a:defRPr sz="1000"/>
             </a:lvl8pPr>
             <a:lvl9pPr>
-              <a:defRPr sz="1400"/>
+              <a:defRPr sz="1000"/>
             </a:lvl9pPr>
           </a:lstStyle>
           <a:p>
@@ -2447,8 +2447,8 @@
         </p:nvSpPr>
         <p:spPr>
           <a:xfrm>
-            <a:off x="304802" y="718881"/>
-            <a:ext cx="2005541" cy="2349874"/>
+            <a:off x="228602" y="478368"/>
+            <a:ext cx="1504156" cy="1563687"/>
           </a:xfrm>
         </p:spPr>
         <p:txBody>
@@ -2456,39 +2456,39 @@
           <a:lstStyle>
             <a:lvl1pPr marL="0" indent="0">
               <a:buNone/>
-              <a:defRPr sz="1000"/>
+              <a:defRPr sz="700"/>
             </a:lvl1pPr>
-            <a:lvl2pPr marL="300316" indent="0">
-              <a:buNone/>
-              <a:defRPr sz="800"/>
+            <a:lvl2pPr marL="224576" indent="0">
+              <a:buNone/>
+              <a:defRPr sz="600"/>
             </a:lvl2pPr>
-            <a:lvl3pPr marL="600632" indent="0">
-              <a:buNone/>
-              <a:defRPr sz="600"/>
+            <a:lvl3pPr marL="449153" indent="0">
+              <a:buNone/>
+              <a:defRPr sz="400"/>
             </a:lvl3pPr>
-            <a:lvl4pPr marL="900947" indent="0">
-              <a:buNone/>
-              <a:defRPr sz="600"/>
+            <a:lvl4pPr marL="673728" indent="0">
+              <a:buNone/>
+              <a:defRPr sz="400"/>
             </a:lvl4pPr>
-            <a:lvl5pPr marL="1201263" indent="0">
-              <a:buNone/>
-              <a:defRPr sz="600"/>
+            <a:lvl5pPr marL="898304" indent="0">
+              <a:buNone/>
+              <a:defRPr sz="400"/>
             </a:lvl5pPr>
-            <a:lvl6pPr marL="1501579" indent="0">
-              <a:buNone/>
-              <a:defRPr sz="600"/>
+            <a:lvl6pPr marL="1122881" indent="0">
+              <a:buNone/>
+              <a:defRPr sz="400"/>
             </a:lvl6pPr>
-            <a:lvl7pPr marL="1801895" indent="0">
-              <a:buNone/>
-              <a:defRPr sz="600"/>
+            <a:lvl7pPr marL="1347457" indent="0">
+              <a:buNone/>
+              <a:defRPr sz="400"/>
             </a:lvl7pPr>
-            <a:lvl8pPr marL="2102209" indent="0">
-              <a:buNone/>
-              <a:defRPr sz="600"/>
+            <a:lvl8pPr marL="1572032" indent="0">
+              <a:buNone/>
+              <a:defRPr sz="400"/>
             </a:lvl8pPr>
-            <a:lvl9pPr marL="2402525" indent="0">
-              <a:buNone/>
-              <a:defRPr sz="600"/>
+            <a:lvl9pPr marL="1796608" indent="0">
+              <a:buNone/>
+              <a:defRPr sz="400"/>
             </a:lvl9pPr>
           </a:lstStyle>
           <a:p>
@@ -2517,7 +2517,7 @@
           <a:p>
             <a:fld id="{5D78CD70-2F04-42EE-8C6B-782007D6293F}" type="datetimeFigureOut">
               <a:rPr kumimoji="1" lang="ja-JP" altLang="en-US" smtClean="0"/>
-              <a:t>2017/8/4</a:t>
+              <a:t>2017/8/12</a:t>
             </a:fld>
             <a:endParaRPr kumimoji="1" lang="ja-JP" altLang="en-US"/>
           </a:p>
@@ -2607,15 +2607,15 @@
         </p:nvSpPr>
         <p:spPr>
           <a:xfrm>
-            <a:off x="1194859" y="2404747"/>
-            <a:ext cx="3657600" cy="283894"/>
+            <a:off x="896144" y="1600202"/>
+            <a:ext cx="2743200" cy="188913"/>
           </a:xfrm>
         </p:spPr>
         <p:txBody>
           <a:bodyPr anchor="b"/>
           <a:lstStyle>
             <a:lvl1pPr algn="l">
-              <a:defRPr sz="1400" b="1"/>
+              <a:defRPr sz="1000" b="1"/>
             </a:lvl1pPr>
           </a:lstStyle>
           <a:p>
@@ -2639,8 +2639,8 @@
         </p:nvSpPr>
         <p:spPr>
           <a:xfrm>
-            <a:off x="1194859" y="306955"/>
-            <a:ext cx="3657600" cy="2061210"/>
+            <a:off x="896144" y="204259"/>
+            <a:ext cx="2743200" cy="1371600"/>
           </a:xfrm>
         </p:spPr>
         <p:txBody>
@@ -2648,39 +2648,39 @@
           <a:lstStyle>
             <a:lvl1pPr marL="0" indent="0">
               <a:buNone/>
-              <a:defRPr sz="2200"/>
+              <a:defRPr sz="1600"/>
             </a:lvl1pPr>
-            <a:lvl2pPr marL="300316" indent="0">
-              <a:buNone/>
-              <a:defRPr sz="1800"/>
+            <a:lvl2pPr marL="224576" indent="0">
+              <a:buNone/>
+              <a:defRPr sz="1300"/>
             </a:lvl2pPr>
-            <a:lvl3pPr marL="600632" indent="0">
-              <a:buNone/>
-              <a:defRPr sz="1600"/>
+            <a:lvl3pPr marL="449153" indent="0">
+              <a:buNone/>
+              <a:defRPr sz="1200"/>
             </a:lvl3pPr>
-            <a:lvl4pPr marL="900947" indent="0">
-              <a:buNone/>
-              <a:defRPr sz="1400"/>
+            <a:lvl4pPr marL="673728" indent="0">
+              <a:buNone/>
+              <a:defRPr sz="1000"/>
             </a:lvl4pPr>
-            <a:lvl5pPr marL="1201263" indent="0">
-              <a:buNone/>
-              <a:defRPr sz="1400"/>
+            <a:lvl5pPr marL="898304" indent="0">
+              <a:buNone/>
+              <a:defRPr sz="1000"/>
             </a:lvl5pPr>
-            <a:lvl6pPr marL="1501579" indent="0">
-              <a:buNone/>
-              <a:defRPr sz="1400"/>
+            <a:lvl6pPr marL="1122881" indent="0">
+              <a:buNone/>
+              <a:defRPr sz="1000"/>
             </a:lvl6pPr>
-            <a:lvl7pPr marL="1801895" indent="0">
-              <a:buNone/>
-              <a:defRPr sz="1400"/>
+            <a:lvl7pPr marL="1347457" indent="0">
+              <a:buNone/>
+              <a:defRPr sz="1000"/>
             </a:lvl7pPr>
-            <a:lvl8pPr marL="2102209" indent="0">
-              <a:buNone/>
-              <a:defRPr sz="1400"/>
+            <a:lvl8pPr marL="1572032" indent="0">
+              <a:buNone/>
+              <a:defRPr sz="1000"/>
             </a:lvl8pPr>
-            <a:lvl9pPr marL="2402525" indent="0">
-              <a:buNone/>
-              <a:defRPr sz="1400"/>
+            <a:lvl9pPr marL="1796608" indent="0">
+              <a:buNone/>
+              <a:defRPr sz="1000"/>
             </a:lvl9pPr>
           </a:lstStyle>
           <a:p>
@@ -2700,8 +2700,8 @@
         </p:nvSpPr>
         <p:spPr>
           <a:xfrm>
-            <a:off x="1194859" y="2688640"/>
-            <a:ext cx="3657600" cy="403176"/>
+            <a:off x="896144" y="1789113"/>
+            <a:ext cx="2743200" cy="268287"/>
           </a:xfrm>
         </p:spPr>
         <p:txBody>
@@ -2709,39 +2709,39 @@
           <a:lstStyle>
             <a:lvl1pPr marL="0" indent="0">
               <a:buNone/>
-              <a:defRPr sz="1000"/>
+              <a:defRPr sz="700"/>
             </a:lvl1pPr>
-            <a:lvl2pPr marL="300316" indent="0">
-              <a:buNone/>
-              <a:defRPr sz="800"/>
+            <a:lvl2pPr marL="224576" indent="0">
+              <a:buNone/>
+              <a:defRPr sz="600"/>
             </a:lvl2pPr>
-            <a:lvl3pPr marL="600632" indent="0">
-              <a:buNone/>
-              <a:defRPr sz="600"/>
+            <a:lvl3pPr marL="449153" indent="0">
+              <a:buNone/>
+              <a:defRPr sz="400"/>
             </a:lvl3pPr>
-            <a:lvl4pPr marL="900947" indent="0">
-              <a:buNone/>
-              <a:defRPr sz="600"/>
+            <a:lvl4pPr marL="673728" indent="0">
+              <a:buNone/>
+              <a:defRPr sz="400"/>
             </a:lvl4pPr>
-            <a:lvl5pPr marL="1201263" indent="0">
-              <a:buNone/>
-              <a:defRPr sz="600"/>
+            <a:lvl5pPr marL="898304" indent="0">
+              <a:buNone/>
+              <a:defRPr sz="400"/>
             </a:lvl5pPr>
-            <a:lvl6pPr marL="1501579" indent="0">
-              <a:buNone/>
-              <a:defRPr sz="600"/>
+            <a:lvl6pPr marL="1122881" indent="0">
+              <a:buNone/>
+              <a:defRPr sz="400"/>
             </a:lvl6pPr>
-            <a:lvl7pPr marL="1801895" indent="0">
-              <a:buNone/>
-              <a:defRPr sz="600"/>
+            <a:lvl7pPr marL="1347457" indent="0">
+              <a:buNone/>
+              <a:defRPr sz="400"/>
             </a:lvl7pPr>
-            <a:lvl8pPr marL="2102209" indent="0">
-              <a:buNone/>
-              <a:defRPr sz="600"/>
+            <a:lvl8pPr marL="1572032" indent="0">
+              <a:buNone/>
+              <a:defRPr sz="400"/>
             </a:lvl8pPr>
-            <a:lvl9pPr marL="2402525" indent="0">
-              <a:buNone/>
-              <a:defRPr sz="600"/>
+            <a:lvl9pPr marL="1796608" indent="0">
+              <a:buNone/>
+              <a:defRPr sz="400"/>
             </a:lvl9pPr>
           </a:lstStyle>
           <a:p>
@@ -2770,7 +2770,7 @@
           <a:p>
             <a:fld id="{5D78CD70-2F04-42EE-8C6B-782007D6293F}" type="datetimeFigureOut">
               <a:rPr kumimoji="1" lang="ja-JP" altLang="en-US" smtClean="0"/>
-              <a:t>2017/8/4</a:t>
+              <a:t>2017/8/12</a:t>
             </a:fld>
             <a:endParaRPr kumimoji="1" lang="ja-JP" altLang="en-US"/>
           </a:p>
@@ -2865,15 +2865,15 @@
         </p:nvSpPr>
         <p:spPr>
           <a:xfrm>
-            <a:off x="304802" y="137575"/>
-            <a:ext cx="5486400" cy="572558"/>
+            <a:off x="228602" y="91548"/>
+            <a:ext cx="4114800" cy="381000"/>
           </a:xfrm>
           <a:prstGeom prst="rect">
             <a:avLst/>
           </a:prstGeom>
         </p:spPr>
         <p:txBody>
-          <a:bodyPr vert="horz" lIns="60062" tIns="30031" rIns="60062" bIns="30031" rtlCol="0" anchor="ctr">
+          <a:bodyPr vert="horz" lIns="44914" tIns="22457" rIns="44914" bIns="22457" rtlCol="0" anchor="ctr">
             <a:normAutofit/>
           </a:bodyPr>
           <a:lstStyle/>
@@ -2898,15 +2898,15 @@
         </p:nvSpPr>
         <p:spPr>
           <a:xfrm>
-            <a:off x="304802" y="801582"/>
-            <a:ext cx="5486400" cy="2267172"/>
+            <a:off x="228602" y="533401"/>
+            <a:ext cx="4114800" cy="1508654"/>
           </a:xfrm>
           <a:prstGeom prst="rect">
             <a:avLst/>
           </a:prstGeom>
         </p:spPr>
         <p:txBody>
-          <a:bodyPr vert="horz" lIns="60062" tIns="30031" rIns="60062" bIns="30031" rtlCol="0">
+          <a:bodyPr vert="horz" lIns="44914" tIns="22457" rIns="44914" bIns="22457" rtlCol="0">
             <a:normAutofit/>
           </a:bodyPr>
           <a:lstStyle/>
@@ -2992,18 +2992,18 @@
         </p:nvSpPr>
         <p:spPr>
           <a:xfrm>
-            <a:off x="304801" y="3184062"/>
-            <a:ext cx="1422401" cy="182900"/>
+            <a:off x="228602" y="2118785"/>
+            <a:ext cx="1066801" cy="121708"/>
           </a:xfrm>
           <a:prstGeom prst="rect">
             <a:avLst/>
           </a:prstGeom>
         </p:spPr>
         <p:txBody>
-          <a:bodyPr vert="horz" lIns="60062" tIns="30031" rIns="60062" bIns="30031" rtlCol="0" anchor="ctr"/>
+          <a:bodyPr vert="horz" lIns="44914" tIns="22457" rIns="44914" bIns="22457" rtlCol="0" anchor="ctr"/>
           <a:lstStyle>
             <a:lvl1pPr algn="l">
-              <a:defRPr sz="800">
+              <a:defRPr sz="600">
                 <a:solidFill>
                   <a:schemeClr val="tx1">
                     <a:tint val="75000"/>
@@ -3015,7 +3015,7 @@
           <a:p>
             <a:fld id="{5D78CD70-2F04-42EE-8C6B-782007D6293F}" type="datetimeFigureOut">
               <a:rPr kumimoji="1" lang="ja-JP" altLang="en-US" smtClean="0"/>
-              <a:t>2017/8/4</a:t>
+              <a:t>2017/8/12</a:t>
             </a:fld>
             <a:endParaRPr kumimoji="1" lang="ja-JP" altLang="en-US"/>
           </a:p>
@@ -3033,18 +3033,18 @@
         </p:nvSpPr>
         <p:spPr>
           <a:xfrm>
-            <a:off x="2082802" y="3184062"/>
-            <a:ext cx="1930400" cy="182900"/>
+            <a:off x="1562102" y="2118785"/>
+            <a:ext cx="1447800" cy="121708"/>
           </a:xfrm>
           <a:prstGeom prst="rect">
             <a:avLst/>
           </a:prstGeom>
         </p:spPr>
         <p:txBody>
-          <a:bodyPr vert="horz" lIns="60062" tIns="30031" rIns="60062" bIns="30031" rtlCol="0" anchor="ctr"/>
+          <a:bodyPr vert="horz" lIns="44914" tIns="22457" rIns="44914" bIns="22457" rtlCol="0" anchor="ctr"/>
           <a:lstStyle>
             <a:lvl1pPr algn="ctr">
-              <a:defRPr sz="800">
+              <a:defRPr sz="600">
                 <a:solidFill>
                   <a:schemeClr val="tx1">
                     <a:tint val="75000"/>
@@ -3070,18 +3070,18 @@
         </p:nvSpPr>
         <p:spPr>
           <a:xfrm>
-            <a:off x="4368802" y="3184062"/>
-            <a:ext cx="1422401" cy="182900"/>
+            <a:off x="3276603" y="2118785"/>
+            <a:ext cx="1066801" cy="121708"/>
           </a:xfrm>
           <a:prstGeom prst="rect">
             <a:avLst/>
           </a:prstGeom>
         </p:spPr>
         <p:txBody>
-          <a:bodyPr vert="horz" lIns="60062" tIns="30031" rIns="60062" bIns="30031" rtlCol="0" anchor="ctr"/>
+          <a:bodyPr vert="horz" lIns="44914" tIns="22457" rIns="44914" bIns="22457" rtlCol="0" anchor="ctr"/>
           <a:lstStyle>
             <a:lvl1pPr algn="r">
-              <a:defRPr sz="800">
+              <a:defRPr sz="600">
                 <a:solidFill>
                   <a:schemeClr val="tx1">
                     <a:tint val="75000"/>
@@ -3122,12 +3122,12 @@
   </p:sldLayoutIdLst>
   <p:txStyles>
     <p:titleStyle>
-      <a:lvl1pPr algn="ctr" defTabSz="600632" rtl="0" eaLnBrk="1" latinLnBrk="0" hangingPunct="1">
+      <a:lvl1pPr algn="ctr" defTabSz="449153" rtl="0" eaLnBrk="1" latinLnBrk="0" hangingPunct="1">
         <a:spcBef>
           <a:spcPct val="0"/>
         </a:spcBef>
         <a:buNone/>
-        <a:defRPr kumimoji="1" sz="3000" kern="1200">
+        <a:defRPr kumimoji="1" sz="2200" kern="1200">
           <a:solidFill>
             <a:schemeClr val="tx1"/>
           </a:solidFill>
@@ -3138,37 +3138,7 @@
       </a:lvl1pPr>
     </p:titleStyle>
     <p:bodyStyle>
-      <a:lvl1pPr marL="225236" indent="-225236" algn="l" defTabSz="600632" rtl="0" eaLnBrk="1" latinLnBrk="0" hangingPunct="1">
-        <a:spcBef>
-          <a:spcPct val="20000"/>
-        </a:spcBef>
-        <a:buFont typeface="Arial" panose="020B0604020202020204" pitchFamily="34" charset="0"/>
-        <a:buChar char="•"/>
-        <a:defRPr kumimoji="1" sz="2200" kern="1200">
-          <a:solidFill>
-            <a:schemeClr val="tx1"/>
-          </a:solidFill>
-          <a:latin typeface="+mn-lt"/>
-          <a:ea typeface="+mn-ea"/>
-          <a:cs typeface="+mn-cs"/>
-        </a:defRPr>
-      </a:lvl1pPr>
-      <a:lvl2pPr marL="488013" indent="-187697" algn="l" defTabSz="600632" rtl="0" eaLnBrk="1" latinLnBrk="0" hangingPunct="1">
-        <a:spcBef>
-          <a:spcPct val="20000"/>
-        </a:spcBef>
-        <a:buFont typeface="Arial" panose="020B0604020202020204" pitchFamily="34" charset="0"/>
-        <a:buChar char="–"/>
-        <a:defRPr kumimoji="1" sz="1800" kern="1200">
-          <a:solidFill>
-            <a:schemeClr val="tx1"/>
-          </a:solidFill>
-          <a:latin typeface="+mn-lt"/>
-          <a:ea typeface="+mn-ea"/>
-          <a:cs typeface="+mn-cs"/>
-        </a:defRPr>
-      </a:lvl2pPr>
-      <a:lvl3pPr marL="750790" indent="-150158" algn="l" defTabSz="600632" rtl="0" eaLnBrk="1" latinLnBrk="0" hangingPunct="1">
+      <a:lvl1pPr marL="168431" indent="-168431" algn="l" defTabSz="449153" rtl="0" eaLnBrk="1" latinLnBrk="0" hangingPunct="1">
         <a:spcBef>
           <a:spcPct val="20000"/>
         </a:spcBef>
@@ -3182,14 +3152,44 @@
           <a:ea typeface="+mn-ea"/>
           <a:cs typeface="+mn-cs"/>
         </a:defRPr>
-      </a:lvl3pPr>
-      <a:lvl4pPr marL="1051105" indent="-150158" algn="l" defTabSz="600632" rtl="0" eaLnBrk="1" latinLnBrk="0" hangingPunct="1">
+      </a:lvl1pPr>
+      <a:lvl2pPr marL="364936" indent="-140360" algn="l" defTabSz="449153" rtl="0" eaLnBrk="1" latinLnBrk="0" hangingPunct="1">
         <a:spcBef>
           <a:spcPct val="20000"/>
         </a:spcBef>
         <a:buFont typeface="Arial" panose="020B0604020202020204" pitchFamily="34" charset="0"/>
         <a:buChar char="–"/>
-        <a:defRPr kumimoji="1" sz="1400" kern="1200">
+        <a:defRPr kumimoji="1" sz="1300" kern="1200">
+          <a:solidFill>
+            <a:schemeClr val="tx1"/>
+          </a:solidFill>
+          <a:latin typeface="+mn-lt"/>
+          <a:ea typeface="+mn-ea"/>
+          <a:cs typeface="+mn-cs"/>
+        </a:defRPr>
+      </a:lvl2pPr>
+      <a:lvl3pPr marL="561441" indent="-112288" algn="l" defTabSz="449153" rtl="0" eaLnBrk="1" latinLnBrk="0" hangingPunct="1">
+        <a:spcBef>
+          <a:spcPct val="20000"/>
+        </a:spcBef>
+        <a:buFont typeface="Arial" panose="020B0604020202020204" pitchFamily="34" charset="0"/>
+        <a:buChar char="•"/>
+        <a:defRPr kumimoji="1" sz="1200" kern="1200">
+          <a:solidFill>
+            <a:schemeClr val="tx1"/>
+          </a:solidFill>
+          <a:latin typeface="+mn-lt"/>
+          <a:ea typeface="+mn-ea"/>
+          <a:cs typeface="+mn-cs"/>
+        </a:defRPr>
+      </a:lvl3pPr>
+      <a:lvl4pPr marL="786016" indent="-112288" algn="l" defTabSz="449153" rtl="0" eaLnBrk="1" latinLnBrk="0" hangingPunct="1">
+        <a:spcBef>
+          <a:spcPct val="20000"/>
+        </a:spcBef>
+        <a:buFont typeface="Arial" panose="020B0604020202020204" pitchFamily="34" charset="0"/>
+        <a:buChar char="–"/>
+        <a:defRPr kumimoji="1" sz="1000" kern="1200">
           <a:solidFill>
             <a:schemeClr val="tx1"/>
           </a:solidFill>
@@ -3198,13 +3198,13 @@
           <a:cs typeface="+mn-cs"/>
         </a:defRPr>
       </a:lvl4pPr>
-      <a:lvl5pPr marL="1351421" indent="-150158" algn="l" defTabSz="600632" rtl="0" eaLnBrk="1" latinLnBrk="0" hangingPunct="1">
+      <a:lvl5pPr marL="1010593" indent="-112288" algn="l" defTabSz="449153" rtl="0" eaLnBrk="1" latinLnBrk="0" hangingPunct="1">
         <a:spcBef>
           <a:spcPct val="20000"/>
         </a:spcBef>
         <a:buFont typeface="Arial" panose="020B0604020202020204" pitchFamily="34" charset="0"/>
         <a:buChar char="»"/>
-        <a:defRPr kumimoji="1" sz="1400" kern="1200">
+        <a:defRPr kumimoji="1" sz="1000" kern="1200">
           <a:solidFill>
             <a:schemeClr val="tx1"/>
           </a:solidFill>
@@ -3213,13 +3213,13 @@
           <a:cs typeface="+mn-cs"/>
         </a:defRPr>
       </a:lvl5pPr>
-      <a:lvl6pPr marL="1651737" indent="-150158" algn="l" defTabSz="600632" rtl="0" eaLnBrk="1" latinLnBrk="0" hangingPunct="1">
+      <a:lvl6pPr marL="1235169" indent="-112288" algn="l" defTabSz="449153" rtl="0" eaLnBrk="1" latinLnBrk="0" hangingPunct="1">
         <a:spcBef>
           <a:spcPct val="20000"/>
         </a:spcBef>
         <a:buFont typeface="Arial" panose="020B0604020202020204" pitchFamily="34" charset="0"/>
         <a:buChar char="•"/>
-        <a:defRPr kumimoji="1" sz="1400" kern="1200">
+        <a:defRPr kumimoji="1" sz="1000" kern="1200">
           <a:solidFill>
             <a:schemeClr val="tx1"/>
           </a:solidFill>
@@ -3228,13 +3228,13 @@
           <a:cs typeface="+mn-cs"/>
         </a:defRPr>
       </a:lvl6pPr>
-      <a:lvl7pPr marL="1952051" indent="-150158" algn="l" defTabSz="600632" rtl="0" eaLnBrk="1" latinLnBrk="0" hangingPunct="1">
+      <a:lvl7pPr marL="1459744" indent="-112288" algn="l" defTabSz="449153" rtl="0" eaLnBrk="1" latinLnBrk="0" hangingPunct="1">
         <a:spcBef>
           <a:spcPct val="20000"/>
         </a:spcBef>
         <a:buFont typeface="Arial" panose="020B0604020202020204" pitchFamily="34" charset="0"/>
         <a:buChar char="•"/>
-        <a:defRPr kumimoji="1" sz="1400" kern="1200">
+        <a:defRPr kumimoji="1" sz="1000" kern="1200">
           <a:solidFill>
             <a:schemeClr val="tx1"/>
           </a:solidFill>
@@ -3243,13 +3243,13 @@
           <a:cs typeface="+mn-cs"/>
         </a:defRPr>
       </a:lvl7pPr>
-      <a:lvl8pPr marL="2252367" indent="-150158" algn="l" defTabSz="600632" rtl="0" eaLnBrk="1" latinLnBrk="0" hangingPunct="1">
+      <a:lvl8pPr marL="1684320" indent="-112288" algn="l" defTabSz="449153" rtl="0" eaLnBrk="1" latinLnBrk="0" hangingPunct="1">
         <a:spcBef>
           <a:spcPct val="20000"/>
         </a:spcBef>
         <a:buFont typeface="Arial" panose="020B0604020202020204" pitchFamily="34" charset="0"/>
         <a:buChar char="•"/>
-        <a:defRPr kumimoji="1" sz="1400" kern="1200">
+        <a:defRPr kumimoji="1" sz="1000" kern="1200">
           <a:solidFill>
             <a:schemeClr val="tx1"/>
           </a:solidFill>
@@ -3258,13 +3258,13 @@
           <a:cs typeface="+mn-cs"/>
         </a:defRPr>
       </a:lvl8pPr>
-      <a:lvl9pPr marL="2552682" indent="-150158" algn="l" defTabSz="600632" rtl="0" eaLnBrk="1" latinLnBrk="0" hangingPunct="1">
+      <a:lvl9pPr marL="1908896" indent="-112288" algn="l" defTabSz="449153" rtl="0" eaLnBrk="1" latinLnBrk="0" hangingPunct="1">
         <a:spcBef>
           <a:spcPct val="20000"/>
         </a:spcBef>
         <a:buFont typeface="Arial" panose="020B0604020202020204" pitchFamily="34" charset="0"/>
         <a:buChar char="•"/>
-        <a:defRPr kumimoji="1" sz="1400" kern="1200">
+        <a:defRPr kumimoji="1" sz="1000" kern="1200">
           <a:solidFill>
             <a:schemeClr val="tx1"/>
           </a:solidFill>
@@ -3278,8 +3278,8 @@
       <a:defPPr>
         <a:defRPr lang="ja-JP"/>
       </a:defPPr>
-      <a:lvl1pPr marL="0" algn="l" defTabSz="600632" rtl="0" eaLnBrk="1" latinLnBrk="0" hangingPunct="1">
-        <a:defRPr kumimoji="1" sz="1200" kern="1200">
+      <a:lvl1pPr marL="0" algn="l" defTabSz="449153" rtl="0" eaLnBrk="1" latinLnBrk="0" hangingPunct="1">
+        <a:defRPr kumimoji="1" sz="900" kern="1200">
           <a:solidFill>
             <a:schemeClr val="tx1"/>
           </a:solidFill>
@@ -3288,8 +3288,8 @@
           <a:cs typeface="+mn-cs"/>
         </a:defRPr>
       </a:lvl1pPr>
-      <a:lvl2pPr marL="300316" algn="l" defTabSz="600632" rtl="0" eaLnBrk="1" latinLnBrk="0" hangingPunct="1">
-        <a:defRPr kumimoji="1" sz="1200" kern="1200">
+      <a:lvl2pPr marL="224576" algn="l" defTabSz="449153" rtl="0" eaLnBrk="1" latinLnBrk="0" hangingPunct="1">
+        <a:defRPr kumimoji="1" sz="900" kern="1200">
           <a:solidFill>
             <a:schemeClr val="tx1"/>
           </a:solidFill>
@@ -3298,8 +3298,8 @@
           <a:cs typeface="+mn-cs"/>
         </a:defRPr>
       </a:lvl2pPr>
-      <a:lvl3pPr marL="600632" algn="l" defTabSz="600632" rtl="0" eaLnBrk="1" latinLnBrk="0" hangingPunct="1">
-        <a:defRPr kumimoji="1" sz="1200" kern="1200">
+      <a:lvl3pPr marL="449153" algn="l" defTabSz="449153" rtl="0" eaLnBrk="1" latinLnBrk="0" hangingPunct="1">
+        <a:defRPr kumimoji="1" sz="900" kern="1200">
           <a:solidFill>
             <a:schemeClr val="tx1"/>
           </a:solidFill>
@@ -3308,8 +3308,8 @@
           <a:cs typeface="+mn-cs"/>
         </a:defRPr>
       </a:lvl3pPr>
-      <a:lvl4pPr marL="900947" algn="l" defTabSz="600632" rtl="0" eaLnBrk="1" latinLnBrk="0" hangingPunct="1">
-        <a:defRPr kumimoji="1" sz="1200" kern="1200">
+      <a:lvl4pPr marL="673728" algn="l" defTabSz="449153" rtl="0" eaLnBrk="1" latinLnBrk="0" hangingPunct="1">
+        <a:defRPr kumimoji="1" sz="900" kern="1200">
           <a:solidFill>
             <a:schemeClr val="tx1"/>
           </a:solidFill>
@@ -3318,8 +3318,8 @@
           <a:cs typeface="+mn-cs"/>
         </a:defRPr>
       </a:lvl4pPr>
-      <a:lvl5pPr marL="1201263" algn="l" defTabSz="600632" rtl="0" eaLnBrk="1" latinLnBrk="0" hangingPunct="1">
-        <a:defRPr kumimoji="1" sz="1200" kern="1200">
+      <a:lvl5pPr marL="898304" algn="l" defTabSz="449153" rtl="0" eaLnBrk="1" latinLnBrk="0" hangingPunct="1">
+        <a:defRPr kumimoji="1" sz="900" kern="1200">
           <a:solidFill>
             <a:schemeClr val="tx1"/>
           </a:solidFill>
@@ -3328,8 +3328,8 @@
           <a:cs typeface="+mn-cs"/>
         </a:defRPr>
       </a:lvl5pPr>
-      <a:lvl6pPr marL="1501579" algn="l" defTabSz="600632" rtl="0" eaLnBrk="1" latinLnBrk="0" hangingPunct="1">
-        <a:defRPr kumimoji="1" sz="1200" kern="1200">
+      <a:lvl6pPr marL="1122881" algn="l" defTabSz="449153" rtl="0" eaLnBrk="1" latinLnBrk="0" hangingPunct="1">
+        <a:defRPr kumimoji="1" sz="900" kern="1200">
           <a:solidFill>
             <a:schemeClr val="tx1"/>
           </a:solidFill>
@@ -3338,8 +3338,8 @@
           <a:cs typeface="+mn-cs"/>
         </a:defRPr>
       </a:lvl6pPr>
-      <a:lvl7pPr marL="1801895" algn="l" defTabSz="600632" rtl="0" eaLnBrk="1" latinLnBrk="0" hangingPunct="1">
-        <a:defRPr kumimoji="1" sz="1200" kern="1200">
+      <a:lvl7pPr marL="1347457" algn="l" defTabSz="449153" rtl="0" eaLnBrk="1" latinLnBrk="0" hangingPunct="1">
+        <a:defRPr kumimoji="1" sz="900" kern="1200">
           <a:solidFill>
             <a:schemeClr val="tx1"/>
           </a:solidFill>
@@ -3348,8 +3348,8 @@
           <a:cs typeface="+mn-cs"/>
         </a:defRPr>
       </a:lvl7pPr>
-      <a:lvl8pPr marL="2102209" algn="l" defTabSz="600632" rtl="0" eaLnBrk="1" latinLnBrk="0" hangingPunct="1">
-        <a:defRPr kumimoji="1" sz="1200" kern="1200">
+      <a:lvl8pPr marL="1572032" algn="l" defTabSz="449153" rtl="0" eaLnBrk="1" latinLnBrk="0" hangingPunct="1">
+        <a:defRPr kumimoji="1" sz="900" kern="1200">
           <a:solidFill>
             <a:schemeClr val="tx1"/>
           </a:solidFill>
@@ -3358,8 +3358,8 @@
           <a:cs typeface="+mn-cs"/>
         </a:defRPr>
       </a:lvl8pPr>
-      <a:lvl9pPr marL="2402525" algn="l" defTabSz="600632" rtl="0" eaLnBrk="1" latinLnBrk="0" hangingPunct="1">
-        <a:defRPr kumimoji="1" sz="1200" kern="1200">
+      <a:lvl9pPr marL="1796608" algn="l" defTabSz="449153" rtl="0" eaLnBrk="1" latinLnBrk="0" hangingPunct="1">
+        <a:defRPr kumimoji="1" sz="900" kern="1200">
           <a:solidFill>
             <a:schemeClr val="tx1"/>
           </a:solidFill>
@@ -3390,859 +3390,903 @@
           <a:chExt cx="0" cy="0"/>
         </a:xfrm>
       </p:grpSpPr>
-      <p:sp>
-        <p:nvSpPr>
-          <p:cNvPr id="33" name="円/楕円 32"/>
-          <p:cNvSpPr>
-            <a:spLocks noChangeAspect="1"/>
-          </p:cNvSpPr>
+      <p:grpSp>
+        <p:nvGrpSpPr>
+          <p:cNvPr id="63" name="グループ化 62"/>
+          <p:cNvGrpSpPr/>
           <p:nvPr/>
-        </p:nvSpPr>
-        <p:spPr>
+        </p:nvGrpSpPr>
+        <p:grpSpPr>
           <a:xfrm>
-            <a:off x="1200003" y="480890"/>
-            <a:ext cx="477917" cy="478800"/>
+            <a:off x="180000" y="360000"/>
+            <a:ext cx="4192389" cy="1621433"/>
+            <a:chOff x="240003" y="480890"/>
+            <a:chExt cx="5589852" cy="2161910"/>
           </a:xfrm>
-          <a:prstGeom prst="ellipse">
-            <a:avLst/>
-          </a:prstGeom>
-        </p:spPr>
-        <p:style>
-          <a:lnRef idx="2">
-            <a:schemeClr val="accent3"/>
-          </a:lnRef>
-          <a:fillRef idx="1">
-            <a:schemeClr val="lt1"/>
-          </a:fillRef>
-          <a:effectRef idx="0">
-            <a:schemeClr val="accent3"/>
-          </a:effectRef>
-          <a:fontRef idx="minor">
-            <a:schemeClr val="dk1"/>
-          </a:fontRef>
-        </p:style>
-        <p:txBody>
-          <a:bodyPr wrap="none" lIns="60062" tIns="30031" rIns="60062" bIns="30031" rtlCol="0" anchor="ctr"/>
-          <a:lstStyle/>
-          <a:p>
-            <a:r>
-              <a:rPr lang="en-US" altLang="ja-JP" sz="2400" dirty="0">
+        </p:grpSpPr>
+        <p:sp>
+          <p:nvSpPr>
+            <p:cNvPr id="64" name="円/楕円 63"/>
+            <p:cNvSpPr>
+              <a:spLocks noChangeAspect="1"/>
+            </p:cNvSpPr>
+            <p:nvPr/>
+          </p:nvSpPr>
+          <p:spPr>
+            <a:xfrm>
+              <a:off x="1200003" y="480890"/>
+              <a:ext cx="477917" cy="478800"/>
+            </a:xfrm>
+            <a:prstGeom prst="ellipse">
+              <a:avLst/>
+            </a:prstGeom>
+          </p:spPr>
+          <p:style>
+            <a:lnRef idx="2">
+              <a:schemeClr val="accent3"/>
+            </a:lnRef>
+            <a:fillRef idx="1">
+              <a:schemeClr val="lt1"/>
+            </a:fillRef>
+            <a:effectRef idx="0">
+              <a:schemeClr val="accent3"/>
+            </a:effectRef>
+            <a:fontRef idx="minor">
+              <a:schemeClr val="dk1"/>
+            </a:fontRef>
+          </p:style>
+          <p:txBody>
+            <a:bodyPr wrap="none" lIns="60062" tIns="30031" rIns="60062" bIns="30031" rtlCol="0" anchor="ctr"/>
+            <a:lstStyle/>
+            <a:p>
+              <a:pPr algn="ctr"/>
+              <a:r>
+                <a:rPr lang="en-US" altLang="ja-JP" sz="1600" dirty="0">
+                  <a:latin typeface="源ノ角ゴシック Code JP R It" pitchFamily="34" charset="-128"/>
+                  <a:ea typeface="源ノ角ゴシック Code JP R It" pitchFamily="34" charset="-128"/>
+                </a:rPr>
+                <a:t>s</a:t>
+              </a:r>
+              <a:endParaRPr lang="ja-JP" altLang="en-US" sz="1600" dirty="0">
                 <a:latin typeface="源ノ角ゴシック Code JP R It" pitchFamily="34" charset="-128"/>
                 <a:ea typeface="源ノ角ゴシック Code JP R It" pitchFamily="34" charset="-128"/>
-              </a:rPr>
-              <a:t>s</a:t>
-            </a:r>
-            <a:endParaRPr lang="ja-JP" altLang="en-US" sz="2400" dirty="0">
-              <a:latin typeface="源ノ角ゴシック Code JP R It" pitchFamily="34" charset="-128"/>
-              <a:ea typeface="源ノ角ゴシック Code JP R It" pitchFamily="34" charset="-128"/>
-            </a:endParaRPr>
-          </a:p>
-        </p:txBody>
-      </p:sp>
-      <p:sp>
-        <p:nvSpPr>
-          <p:cNvPr id="34" name="円/楕円 33"/>
-          <p:cNvSpPr>
-            <a:spLocks noChangeAspect="1"/>
-          </p:cNvSpPr>
-          <p:nvPr/>
-        </p:nvSpPr>
-        <p:spPr>
-          <a:xfrm>
-            <a:off x="720003" y="1322444"/>
-            <a:ext cx="477917" cy="478800"/>
-          </a:xfrm>
-          <a:prstGeom prst="ellipse">
-            <a:avLst/>
-          </a:prstGeom>
-        </p:spPr>
-        <p:style>
-          <a:lnRef idx="2">
-            <a:schemeClr val="accent3"/>
-          </a:lnRef>
-          <a:fillRef idx="1">
-            <a:schemeClr val="lt1"/>
-          </a:fillRef>
-          <a:effectRef idx="0">
-            <a:schemeClr val="accent3"/>
-          </a:effectRef>
-          <a:fontRef idx="minor">
-            <a:schemeClr val="dk1"/>
-          </a:fontRef>
-        </p:style>
-        <p:txBody>
-          <a:bodyPr wrap="none" lIns="60062" tIns="30031" rIns="60062" bIns="30031" rtlCol="0" anchor="ctr"/>
-          <a:lstStyle/>
-          <a:p>
-            <a:r>
-              <a:rPr lang="en-US" altLang="ja-JP" sz="2400" dirty="0">
+              </a:endParaRPr>
+            </a:p>
+          </p:txBody>
+        </p:sp>
+        <p:sp>
+          <p:nvSpPr>
+            <p:cNvPr id="65" name="円/楕円 64"/>
+            <p:cNvSpPr>
+              <a:spLocks noChangeAspect="1"/>
+            </p:cNvSpPr>
+            <p:nvPr/>
+          </p:nvSpPr>
+          <p:spPr>
+            <a:xfrm>
+              <a:off x="720003" y="1322444"/>
+              <a:ext cx="477917" cy="478800"/>
+            </a:xfrm>
+            <a:prstGeom prst="ellipse">
+              <a:avLst/>
+            </a:prstGeom>
+          </p:spPr>
+          <p:style>
+            <a:lnRef idx="2">
+              <a:schemeClr val="accent3"/>
+            </a:lnRef>
+            <a:fillRef idx="1">
+              <a:schemeClr val="lt1"/>
+            </a:fillRef>
+            <a:effectRef idx="0">
+              <a:schemeClr val="accent3"/>
+            </a:effectRef>
+            <a:fontRef idx="minor">
+              <a:schemeClr val="dk1"/>
+            </a:fontRef>
+          </p:style>
+          <p:txBody>
+            <a:bodyPr wrap="none" lIns="60062" tIns="30031" rIns="60062" bIns="30031" rtlCol="0" anchor="ctr"/>
+            <a:lstStyle/>
+            <a:p>
+              <a:pPr algn="ctr"/>
+              <a:r>
+                <a:rPr lang="en-US" altLang="ja-JP" sz="1600" dirty="0">
+                  <a:latin typeface="源ノ角ゴシック Code JP R It" pitchFamily="34" charset="-128"/>
+                  <a:ea typeface="源ノ角ゴシック Code JP R It" pitchFamily="34" charset="-128"/>
+                </a:rPr>
+                <a:t>t</a:t>
+              </a:r>
+              <a:endParaRPr lang="ja-JP" altLang="en-US" sz="1600" dirty="0">
                 <a:latin typeface="源ノ角ゴシック Code JP R It" pitchFamily="34" charset="-128"/>
                 <a:ea typeface="源ノ角ゴシック Code JP R It" pitchFamily="34" charset="-128"/>
-              </a:rPr>
-              <a:t>t</a:t>
-            </a:r>
-            <a:endParaRPr lang="ja-JP" altLang="en-US" sz="2400" dirty="0">
-              <a:latin typeface="源ノ角ゴシック Code JP R It" pitchFamily="34" charset="-128"/>
-              <a:ea typeface="源ノ角ゴシック Code JP R It" pitchFamily="34" charset="-128"/>
-            </a:endParaRPr>
-          </a:p>
-        </p:txBody>
-      </p:sp>
-      <p:sp>
-        <p:nvSpPr>
-          <p:cNvPr id="35" name="円/楕円 34"/>
-          <p:cNvSpPr>
-            <a:spLocks noChangeAspect="1"/>
-          </p:cNvSpPr>
-          <p:nvPr/>
-        </p:nvSpPr>
-        <p:spPr>
-          <a:xfrm>
-            <a:off x="240003" y="2164000"/>
-            <a:ext cx="477917" cy="478800"/>
-          </a:xfrm>
-          <a:prstGeom prst="ellipse">
-            <a:avLst/>
-          </a:prstGeom>
-        </p:spPr>
-        <p:style>
-          <a:lnRef idx="2">
-            <a:schemeClr val="accent3"/>
-          </a:lnRef>
-          <a:fillRef idx="1">
-            <a:schemeClr val="lt1"/>
-          </a:fillRef>
-          <a:effectRef idx="0">
-            <a:schemeClr val="accent3"/>
-          </a:effectRef>
-          <a:fontRef idx="minor">
-            <a:schemeClr val="dk1"/>
-          </a:fontRef>
-        </p:style>
-        <p:txBody>
-          <a:bodyPr wrap="none" lIns="60062" tIns="30031" rIns="60062" bIns="30031" rtlCol="0" anchor="ctr"/>
-          <a:lstStyle/>
-          <a:p>
-            <a:r>
-              <a:rPr lang="en-US" altLang="ja-JP" sz="2400" dirty="0">
+              </a:endParaRPr>
+            </a:p>
+          </p:txBody>
+        </p:sp>
+        <p:sp>
+          <p:nvSpPr>
+            <p:cNvPr id="66" name="円/楕円 65"/>
+            <p:cNvSpPr>
+              <a:spLocks noChangeAspect="1"/>
+            </p:cNvSpPr>
+            <p:nvPr/>
+          </p:nvSpPr>
+          <p:spPr>
+            <a:xfrm>
+              <a:off x="240003" y="2164000"/>
+              <a:ext cx="477917" cy="478800"/>
+            </a:xfrm>
+            <a:prstGeom prst="ellipse">
+              <a:avLst/>
+            </a:prstGeom>
+          </p:spPr>
+          <p:style>
+            <a:lnRef idx="2">
+              <a:schemeClr val="accent3"/>
+            </a:lnRef>
+            <a:fillRef idx="1">
+              <a:schemeClr val="lt1"/>
+            </a:fillRef>
+            <a:effectRef idx="0">
+              <a:schemeClr val="accent3"/>
+            </a:effectRef>
+            <a:fontRef idx="minor">
+              <a:schemeClr val="dk1"/>
+            </a:fontRef>
+          </p:style>
+          <p:txBody>
+            <a:bodyPr wrap="none" lIns="60062" tIns="30031" rIns="60062" bIns="30031" rtlCol="0" anchor="ctr"/>
+            <a:lstStyle/>
+            <a:p>
+              <a:pPr algn="ctr"/>
+              <a:r>
+                <a:rPr lang="en-US" altLang="ja-JP" sz="1600" dirty="0">
+                  <a:latin typeface="源ノ角ゴシック Code JP R It" pitchFamily="34" charset="-128"/>
+                  <a:ea typeface="源ノ角ゴシック Code JP R It" pitchFamily="34" charset="-128"/>
+                </a:rPr>
+                <a:t>a</a:t>
+              </a:r>
+              <a:endParaRPr lang="ja-JP" altLang="en-US" sz="1600" dirty="0">
                 <a:latin typeface="源ノ角ゴシック Code JP R It" pitchFamily="34" charset="-128"/>
                 <a:ea typeface="源ノ角ゴシック Code JP R It" pitchFamily="34" charset="-128"/>
-              </a:rPr>
-              <a:t>a</a:t>
-            </a:r>
-            <a:endParaRPr lang="ja-JP" altLang="en-US" sz="2400" dirty="0">
-              <a:latin typeface="源ノ角ゴシック Code JP R It" pitchFamily="34" charset="-128"/>
-              <a:ea typeface="源ノ角ゴシック Code JP R It" pitchFamily="34" charset="-128"/>
-            </a:endParaRPr>
-          </a:p>
-        </p:txBody>
-      </p:sp>
-      <p:sp>
-        <p:nvSpPr>
-          <p:cNvPr id="36" name="円/楕円 35"/>
-          <p:cNvSpPr>
-            <a:spLocks noChangeAspect="1"/>
-          </p:cNvSpPr>
-          <p:nvPr/>
-        </p:nvSpPr>
-        <p:spPr>
-          <a:xfrm>
-            <a:off x="1680003" y="1322444"/>
-            <a:ext cx="477917" cy="478800"/>
-          </a:xfrm>
-          <a:prstGeom prst="ellipse">
-            <a:avLst/>
-          </a:prstGeom>
-        </p:spPr>
-        <p:style>
-          <a:lnRef idx="2">
-            <a:schemeClr val="accent3"/>
-          </a:lnRef>
-          <a:fillRef idx="1">
-            <a:schemeClr val="lt1"/>
-          </a:fillRef>
-          <a:effectRef idx="0">
-            <a:schemeClr val="accent3"/>
-          </a:effectRef>
-          <a:fontRef idx="minor">
-            <a:schemeClr val="dk1"/>
-          </a:fontRef>
-        </p:style>
-        <p:txBody>
-          <a:bodyPr wrap="none" lIns="60062" tIns="30031" rIns="60062" bIns="30031" rtlCol="0" anchor="ctr"/>
-          <a:lstStyle/>
-          <a:p>
-            <a:r>
-              <a:rPr lang="en-US" altLang="ja-JP" sz="2400" dirty="0">
+              </a:endParaRPr>
+            </a:p>
+          </p:txBody>
+        </p:sp>
+        <p:sp>
+          <p:nvSpPr>
+            <p:cNvPr id="67" name="円/楕円 66"/>
+            <p:cNvSpPr>
+              <a:spLocks noChangeAspect="1"/>
+            </p:cNvSpPr>
+            <p:nvPr/>
+          </p:nvSpPr>
+          <p:spPr>
+            <a:xfrm>
+              <a:off x="1680003" y="1322444"/>
+              <a:ext cx="477917" cy="478800"/>
+            </a:xfrm>
+            <a:prstGeom prst="ellipse">
+              <a:avLst/>
+            </a:prstGeom>
+          </p:spPr>
+          <p:style>
+            <a:lnRef idx="2">
+              <a:schemeClr val="accent3"/>
+            </a:lnRef>
+            <a:fillRef idx="1">
+              <a:schemeClr val="lt1"/>
+            </a:fillRef>
+            <a:effectRef idx="0">
+              <a:schemeClr val="accent3"/>
+            </a:effectRef>
+            <a:fontRef idx="minor">
+              <a:schemeClr val="dk1"/>
+            </a:fontRef>
+          </p:style>
+          <p:txBody>
+            <a:bodyPr wrap="none" lIns="60062" tIns="30031" rIns="60062" bIns="30031" rtlCol="0" anchor="ctr"/>
+            <a:lstStyle/>
+            <a:p>
+              <a:pPr algn="ctr"/>
+              <a:r>
+                <a:rPr lang="en-US" altLang="ja-JP" sz="1600" dirty="0">
+                  <a:latin typeface="源ノ角ゴシック Code JP R It" pitchFamily="34" charset="-128"/>
+                  <a:ea typeface="源ノ角ゴシック Code JP R It" pitchFamily="34" charset="-128"/>
+                </a:rPr>
+                <a:t>d</a:t>
+              </a:r>
+              <a:endParaRPr lang="ja-JP" altLang="en-US" sz="1600" dirty="0">
                 <a:latin typeface="源ノ角ゴシック Code JP R It" pitchFamily="34" charset="-128"/>
                 <a:ea typeface="源ノ角ゴシック Code JP R It" pitchFamily="34" charset="-128"/>
-              </a:rPr>
-              <a:t>d</a:t>
-            </a:r>
-            <a:endParaRPr lang="ja-JP" altLang="en-US" sz="2400" dirty="0">
-              <a:latin typeface="源ノ角ゴシック Code JP R It" pitchFamily="34" charset="-128"/>
-              <a:ea typeface="源ノ角ゴシック Code JP R It" pitchFamily="34" charset="-128"/>
-            </a:endParaRPr>
-          </a:p>
-        </p:txBody>
-      </p:sp>
-      <p:sp>
-        <p:nvSpPr>
-          <p:cNvPr id="37" name="円/楕円 36"/>
-          <p:cNvSpPr>
-            <a:spLocks noChangeAspect="1"/>
-          </p:cNvSpPr>
-          <p:nvPr/>
-        </p:nvSpPr>
-        <p:spPr>
-          <a:xfrm>
-            <a:off x="1200003" y="2164000"/>
-            <a:ext cx="477917" cy="478800"/>
-          </a:xfrm>
-          <a:prstGeom prst="ellipse">
-            <a:avLst/>
-          </a:prstGeom>
-        </p:spPr>
-        <p:style>
-          <a:lnRef idx="2">
-            <a:schemeClr val="accent3"/>
-          </a:lnRef>
-          <a:fillRef idx="1">
-            <a:schemeClr val="lt1"/>
-          </a:fillRef>
-          <a:effectRef idx="0">
-            <a:schemeClr val="accent3"/>
-          </a:effectRef>
-          <a:fontRef idx="minor">
-            <a:schemeClr val="dk1"/>
-          </a:fontRef>
-        </p:style>
-        <p:txBody>
-          <a:bodyPr wrap="none" lIns="60062" tIns="30031" rIns="60062" bIns="30031" rtlCol="0" anchor="ctr"/>
-          <a:lstStyle/>
-          <a:p>
-            <a:r>
-              <a:rPr lang="en-US" altLang="ja-JP" sz="2400" dirty="0">
+              </a:endParaRPr>
+            </a:p>
+          </p:txBody>
+        </p:sp>
+        <p:sp>
+          <p:nvSpPr>
+            <p:cNvPr id="68" name="円/楕円 67"/>
+            <p:cNvSpPr>
+              <a:spLocks noChangeAspect="1"/>
+            </p:cNvSpPr>
+            <p:nvPr/>
+          </p:nvSpPr>
+          <p:spPr>
+            <a:xfrm>
+              <a:off x="1200003" y="2164000"/>
+              <a:ext cx="477917" cy="478800"/>
+            </a:xfrm>
+            <a:prstGeom prst="ellipse">
+              <a:avLst/>
+            </a:prstGeom>
+          </p:spPr>
+          <p:style>
+            <a:lnRef idx="2">
+              <a:schemeClr val="accent3"/>
+            </a:lnRef>
+            <a:fillRef idx="1">
+              <a:schemeClr val="lt1"/>
+            </a:fillRef>
+            <a:effectRef idx="0">
+              <a:schemeClr val="accent3"/>
+            </a:effectRef>
+            <a:fontRef idx="minor">
+              <a:schemeClr val="dk1"/>
+            </a:fontRef>
+          </p:style>
+          <p:txBody>
+            <a:bodyPr wrap="none" lIns="60062" tIns="30031" rIns="60062" bIns="30031" rtlCol="0" anchor="ctr"/>
+            <a:lstStyle/>
+            <a:p>
+              <a:pPr algn="ctr"/>
+              <a:r>
+                <a:rPr lang="en-US" altLang="ja-JP" sz="1600" dirty="0">
+                  <a:latin typeface="源ノ角ゴシック Code JP R It" pitchFamily="34" charset="-128"/>
+                  <a:ea typeface="源ノ角ゴシック Code JP R It" pitchFamily="34" charset="-128"/>
+                </a:rPr>
+                <a:t>u</a:t>
+              </a:r>
+              <a:endParaRPr lang="ja-JP" altLang="en-US" sz="1600" dirty="0">
                 <a:latin typeface="源ノ角ゴシック Code JP R It" pitchFamily="34" charset="-128"/>
                 <a:ea typeface="源ノ角ゴシック Code JP R It" pitchFamily="34" charset="-128"/>
-              </a:rPr>
-              <a:t>u</a:t>
-            </a:r>
-            <a:endParaRPr lang="ja-JP" altLang="en-US" sz="2400" dirty="0">
-              <a:latin typeface="源ノ角ゴシック Code JP R It" pitchFamily="34" charset="-128"/>
-              <a:ea typeface="源ノ角ゴシック Code JP R It" pitchFamily="34" charset="-128"/>
-            </a:endParaRPr>
-          </a:p>
-        </p:txBody>
-      </p:sp>
-      <p:cxnSp>
-        <p:nvCxnSpPr>
-          <p:cNvPr id="38" name="直線コネクタ 37"/>
-          <p:cNvCxnSpPr>
-            <a:stCxn id="33" idx="3"/>
-            <a:endCxn id="34" idx="0"/>
-          </p:cNvCxnSpPr>
-          <p:nvPr/>
-        </p:nvCxnSpPr>
-        <p:spPr>
-          <a:xfrm flipH="1">
-            <a:off x="958962" y="889571"/>
-            <a:ext cx="311030" cy="432873"/>
-          </a:xfrm>
-          <a:prstGeom prst="line">
-            <a:avLst/>
-          </a:prstGeom>
-          <a:ln w="25400"/>
-        </p:spPr>
-        <p:style>
-          <a:lnRef idx="1">
-            <a:schemeClr val="accent3"/>
-          </a:lnRef>
-          <a:fillRef idx="0">
-            <a:schemeClr val="accent3"/>
-          </a:fillRef>
-          <a:effectRef idx="0">
-            <a:schemeClr val="accent3"/>
-          </a:effectRef>
-          <a:fontRef idx="minor">
-            <a:schemeClr val="tx1"/>
-          </a:fontRef>
-        </p:style>
-      </p:cxnSp>
-      <p:cxnSp>
-        <p:nvCxnSpPr>
-          <p:cNvPr id="39" name="直線コネクタ 38"/>
-          <p:cNvCxnSpPr>
-            <a:stCxn id="33" idx="5"/>
-            <a:endCxn id="36" idx="0"/>
-          </p:cNvCxnSpPr>
-          <p:nvPr/>
-        </p:nvCxnSpPr>
-        <p:spPr>
-          <a:xfrm>
-            <a:off x="1607931" y="889571"/>
-            <a:ext cx="311031" cy="432873"/>
-          </a:xfrm>
-          <a:prstGeom prst="line">
-            <a:avLst/>
-          </a:prstGeom>
-          <a:ln w="25400"/>
-        </p:spPr>
-        <p:style>
-          <a:lnRef idx="1">
-            <a:schemeClr val="accent3"/>
-          </a:lnRef>
-          <a:fillRef idx="0">
-            <a:schemeClr val="accent3"/>
-          </a:fillRef>
-          <a:effectRef idx="0">
-            <a:schemeClr val="accent3"/>
-          </a:effectRef>
-          <a:fontRef idx="minor">
-            <a:schemeClr val="tx1"/>
-          </a:fontRef>
-        </p:style>
-      </p:cxnSp>
-      <p:cxnSp>
-        <p:nvCxnSpPr>
-          <p:cNvPr id="40" name="直線コネクタ 39"/>
-          <p:cNvCxnSpPr>
-            <a:stCxn id="34" idx="3"/>
-            <a:endCxn id="35" idx="0"/>
-          </p:cNvCxnSpPr>
-          <p:nvPr/>
-        </p:nvCxnSpPr>
-        <p:spPr>
-          <a:xfrm flipH="1">
-            <a:off x="478962" y="1731125"/>
-            <a:ext cx="311030" cy="432875"/>
-          </a:xfrm>
-          <a:prstGeom prst="line">
-            <a:avLst/>
-          </a:prstGeom>
-          <a:ln w="25400"/>
-        </p:spPr>
-        <p:style>
-          <a:lnRef idx="1">
-            <a:schemeClr val="accent3"/>
-          </a:lnRef>
-          <a:fillRef idx="0">
-            <a:schemeClr val="accent3"/>
-          </a:fillRef>
-          <a:effectRef idx="0">
-            <a:schemeClr val="accent3"/>
-          </a:effectRef>
-          <a:fontRef idx="minor">
-            <a:schemeClr val="tx1"/>
-          </a:fontRef>
-        </p:style>
-      </p:cxnSp>
-      <p:cxnSp>
-        <p:nvCxnSpPr>
-          <p:cNvPr id="41" name="直線コネクタ 40"/>
-          <p:cNvCxnSpPr>
-            <a:stCxn id="34" idx="5"/>
-            <a:endCxn id="37" idx="0"/>
-          </p:cNvCxnSpPr>
-          <p:nvPr/>
-        </p:nvCxnSpPr>
-        <p:spPr>
-          <a:xfrm>
-            <a:off x="1127931" y="1731125"/>
-            <a:ext cx="311031" cy="432875"/>
-          </a:xfrm>
-          <a:prstGeom prst="line">
-            <a:avLst/>
-          </a:prstGeom>
-          <a:ln w="25400"/>
-        </p:spPr>
-        <p:style>
-          <a:lnRef idx="1">
-            <a:schemeClr val="accent3"/>
-          </a:lnRef>
-          <a:fillRef idx="0">
-            <a:schemeClr val="accent3"/>
-          </a:fillRef>
-          <a:effectRef idx="0">
-            <a:schemeClr val="accent3"/>
-          </a:effectRef>
-          <a:fontRef idx="minor">
-            <a:schemeClr val="tx1"/>
-          </a:fontRef>
-        </p:style>
-      </p:cxnSp>
-      <p:sp>
-        <p:nvSpPr>
-          <p:cNvPr id="43" name="円/楕円 42"/>
-          <p:cNvSpPr>
-            <a:spLocks noChangeAspect="1"/>
-          </p:cNvSpPr>
-          <p:nvPr/>
-        </p:nvSpPr>
-        <p:spPr>
-          <a:xfrm>
-            <a:off x="3240131" y="1334718"/>
-            <a:ext cx="477917" cy="478800"/>
-          </a:xfrm>
-          <a:prstGeom prst="ellipse">
-            <a:avLst/>
-          </a:prstGeom>
-        </p:spPr>
-        <p:style>
-          <a:lnRef idx="2">
-            <a:schemeClr val="accent3"/>
-          </a:lnRef>
-          <a:fillRef idx="1">
-            <a:schemeClr val="lt1"/>
-          </a:fillRef>
-          <a:effectRef idx="0">
-            <a:schemeClr val="accent3"/>
-          </a:effectRef>
-          <a:fontRef idx="minor">
-            <a:schemeClr val="dk1"/>
-          </a:fontRef>
-        </p:style>
-        <p:txBody>
-          <a:bodyPr wrap="none" lIns="60062" tIns="30031" rIns="60062" bIns="30031" rtlCol="0" anchor="ctr"/>
-          <a:lstStyle/>
-          <a:p>
-            <a:r>
-              <a:rPr lang="en-US" altLang="ja-JP" sz="2400" dirty="0">
+              </a:endParaRPr>
+            </a:p>
+          </p:txBody>
+        </p:sp>
+        <p:cxnSp>
+          <p:nvCxnSpPr>
+            <p:cNvPr id="69" name="直線コネクタ 68"/>
+            <p:cNvCxnSpPr>
+              <a:stCxn id="64" idx="3"/>
+              <a:endCxn id="65" idx="0"/>
+            </p:cNvCxnSpPr>
+            <p:nvPr/>
+          </p:nvCxnSpPr>
+          <p:spPr>
+            <a:xfrm flipH="1">
+              <a:off x="958962" y="889571"/>
+              <a:ext cx="311030" cy="432873"/>
+            </a:xfrm>
+            <a:prstGeom prst="line">
+              <a:avLst/>
+            </a:prstGeom>
+            <a:ln w="25400"/>
+          </p:spPr>
+          <p:style>
+            <a:lnRef idx="1">
+              <a:schemeClr val="accent3"/>
+            </a:lnRef>
+            <a:fillRef idx="0">
+              <a:schemeClr val="accent3"/>
+            </a:fillRef>
+            <a:effectRef idx="0">
+              <a:schemeClr val="accent3"/>
+            </a:effectRef>
+            <a:fontRef idx="minor">
+              <a:schemeClr val="tx1"/>
+            </a:fontRef>
+          </p:style>
+        </p:cxnSp>
+        <p:cxnSp>
+          <p:nvCxnSpPr>
+            <p:cNvPr id="70" name="直線コネクタ 69"/>
+            <p:cNvCxnSpPr>
+              <a:stCxn id="64" idx="5"/>
+              <a:endCxn id="67" idx="0"/>
+            </p:cNvCxnSpPr>
+            <p:nvPr/>
+          </p:nvCxnSpPr>
+          <p:spPr>
+            <a:xfrm>
+              <a:off x="1607931" y="889571"/>
+              <a:ext cx="311031" cy="432873"/>
+            </a:xfrm>
+            <a:prstGeom prst="line">
+              <a:avLst/>
+            </a:prstGeom>
+            <a:ln w="25400"/>
+          </p:spPr>
+          <p:style>
+            <a:lnRef idx="1">
+              <a:schemeClr val="accent3"/>
+            </a:lnRef>
+            <a:fillRef idx="0">
+              <a:schemeClr val="accent3"/>
+            </a:fillRef>
+            <a:effectRef idx="0">
+              <a:schemeClr val="accent3"/>
+            </a:effectRef>
+            <a:fontRef idx="minor">
+              <a:schemeClr val="tx1"/>
+            </a:fontRef>
+          </p:style>
+        </p:cxnSp>
+        <p:cxnSp>
+          <p:nvCxnSpPr>
+            <p:cNvPr id="71" name="直線コネクタ 70"/>
+            <p:cNvCxnSpPr>
+              <a:stCxn id="65" idx="3"/>
+              <a:endCxn id="66" idx="0"/>
+            </p:cNvCxnSpPr>
+            <p:nvPr/>
+          </p:nvCxnSpPr>
+          <p:spPr>
+            <a:xfrm flipH="1">
+              <a:off x="478962" y="1731125"/>
+              <a:ext cx="311030" cy="432875"/>
+            </a:xfrm>
+            <a:prstGeom prst="line">
+              <a:avLst/>
+            </a:prstGeom>
+            <a:ln w="25400"/>
+          </p:spPr>
+          <p:style>
+            <a:lnRef idx="1">
+              <a:schemeClr val="accent3"/>
+            </a:lnRef>
+            <a:fillRef idx="0">
+              <a:schemeClr val="accent3"/>
+            </a:fillRef>
+            <a:effectRef idx="0">
+              <a:schemeClr val="accent3"/>
+            </a:effectRef>
+            <a:fontRef idx="minor">
+              <a:schemeClr val="tx1"/>
+            </a:fontRef>
+          </p:style>
+        </p:cxnSp>
+        <p:cxnSp>
+          <p:nvCxnSpPr>
+            <p:cNvPr id="72" name="直線コネクタ 71"/>
+            <p:cNvCxnSpPr>
+              <a:stCxn id="65" idx="5"/>
+              <a:endCxn id="68" idx="0"/>
+            </p:cNvCxnSpPr>
+            <p:nvPr/>
+          </p:nvCxnSpPr>
+          <p:spPr>
+            <a:xfrm>
+              <a:off x="1127931" y="1731125"/>
+              <a:ext cx="311031" cy="432875"/>
+            </a:xfrm>
+            <a:prstGeom prst="line">
+              <a:avLst/>
+            </a:prstGeom>
+            <a:ln w="25400"/>
+          </p:spPr>
+          <p:style>
+            <a:lnRef idx="1">
+              <a:schemeClr val="accent3"/>
+            </a:lnRef>
+            <a:fillRef idx="0">
+              <a:schemeClr val="accent3"/>
+            </a:fillRef>
+            <a:effectRef idx="0">
+              <a:schemeClr val="accent3"/>
+            </a:effectRef>
+            <a:fontRef idx="minor">
+              <a:schemeClr val="tx1"/>
+            </a:fontRef>
+          </p:style>
+        </p:cxnSp>
+        <p:sp>
+          <p:nvSpPr>
+            <p:cNvPr id="73" name="円/楕円 72"/>
+            <p:cNvSpPr>
+              <a:spLocks noChangeAspect="1"/>
+            </p:cNvSpPr>
+            <p:nvPr/>
+          </p:nvSpPr>
+          <p:spPr>
+            <a:xfrm>
+              <a:off x="3240131" y="1334718"/>
+              <a:ext cx="477917" cy="478800"/>
+            </a:xfrm>
+            <a:prstGeom prst="ellipse">
+              <a:avLst/>
+            </a:prstGeom>
+          </p:spPr>
+          <p:style>
+            <a:lnRef idx="2">
+              <a:schemeClr val="accent3"/>
+            </a:lnRef>
+            <a:fillRef idx="1">
+              <a:schemeClr val="lt1"/>
+            </a:fillRef>
+            <a:effectRef idx="0">
+              <a:schemeClr val="accent3"/>
+            </a:effectRef>
+            <a:fontRef idx="minor">
+              <a:schemeClr val="dk1"/>
+            </a:fontRef>
+          </p:style>
+          <p:txBody>
+            <a:bodyPr wrap="none" lIns="60062" tIns="30031" rIns="60062" bIns="30031" rtlCol="0" anchor="ctr"/>
+            <a:lstStyle/>
+            <a:p>
+              <a:pPr algn="ctr"/>
+              <a:r>
+                <a:rPr lang="en-US" altLang="ja-JP" sz="1600" dirty="0" smtClean="0">
+                  <a:latin typeface="源ノ角ゴシック Code JP R It" pitchFamily="34" charset="-128"/>
+                  <a:ea typeface="源ノ角ゴシック Code JP R It" pitchFamily="34" charset="-128"/>
+                </a:rPr>
+                <a:t> t</a:t>
+              </a:r>
+              <a:r>
+                <a:rPr lang="en-US" altLang="ja-JP" sz="1600" dirty="0">
+                  <a:latin typeface="源ノ角ゴシック Code JP R It" pitchFamily="34" charset="-128"/>
+                  <a:ea typeface="源ノ角ゴシック Code JP R It" pitchFamily="34" charset="-128"/>
+                </a:rPr>
+                <a:t>'</a:t>
+              </a:r>
+              <a:endParaRPr lang="ja-JP" altLang="en-US" sz="1600" dirty="0">
                 <a:latin typeface="源ノ角ゴシック Code JP R It" pitchFamily="34" charset="-128"/>
                 <a:ea typeface="源ノ角ゴシック Code JP R It" pitchFamily="34" charset="-128"/>
-              </a:rPr>
-              <a:t>t'</a:t>
-            </a:r>
-            <a:endParaRPr lang="ja-JP" altLang="en-US" sz="2400" dirty="0">
-              <a:latin typeface="源ノ角ゴシック Code JP R It" pitchFamily="34" charset="-128"/>
-              <a:ea typeface="源ノ角ゴシック Code JP R It" pitchFamily="34" charset="-128"/>
-            </a:endParaRPr>
-          </a:p>
-        </p:txBody>
-      </p:sp>
-      <p:sp>
-        <p:nvSpPr>
-          <p:cNvPr id="44" name="円/楕円 43"/>
-          <p:cNvSpPr>
-            <a:spLocks noChangeAspect="1"/>
-          </p:cNvSpPr>
-          <p:nvPr/>
-        </p:nvSpPr>
-        <p:spPr>
-          <a:xfrm>
-            <a:off x="2760131" y="2164000"/>
-            <a:ext cx="477917" cy="478800"/>
-          </a:xfrm>
-          <a:prstGeom prst="ellipse">
-            <a:avLst/>
-          </a:prstGeom>
-        </p:spPr>
-        <p:style>
-          <a:lnRef idx="2">
-            <a:schemeClr val="accent3"/>
-          </a:lnRef>
-          <a:fillRef idx="1">
-            <a:schemeClr val="lt1"/>
-          </a:fillRef>
-          <a:effectRef idx="0">
-            <a:schemeClr val="accent3"/>
-          </a:effectRef>
-          <a:fontRef idx="minor">
-            <a:schemeClr val="dk1"/>
-          </a:fontRef>
-        </p:style>
-        <p:txBody>
-          <a:bodyPr wrap="none" lIns="60062" tIns="30031" rIns="60062" bIns="30031" rtlCol="0" anchor="ctr"/>
-          <a:lstStyle/>
-          <a:p>
-            <a:r>
-              <a:rPr lang="en-US" altLang="ja-JP" sz="2400" dirty="0">
+              </a:endParaRPr>
+            </a:p>
+          </p:txBody>
+        </p:sp>
+        <p:sp>
+          <p:nvSpPr>
+            <p:cNvPr id="74" name="円/楕円 73"/>
+            <p:cNvSpPr>
+              <a:spLocks noChangeAspect="1"/>
+            </p:cNvSpPr>
+            <p:nvPr/>
+          </p:nvSpPr>
+          <p:spPr>
+            <a:xfrm>
+              <a:off x="2760131" y="2164000"/>
+              <a:ext cx="477917" cy="478800"/>
+            </a:xfrm>
+            <a:prstGeom prst="ellipse">
+              <a:avLst/>
+            </a:prstGeom>
+          </p:spPr>
+          <p:style>
+            <a:lnRef idx="2">
+              <a:schemeClr val="accent3"/>
+            </a:lnRef>
+            <a:fillRef idx="1">
+              <a:schemeClr val="lt1"/>
+            </a:fillRef>
+            <a:effectRef idx="0">
+              <a:schemeClr val="accent3"/>
+            </a:effectRef>
+            <a:fontRef idx="minor">
+              <a:schemeClr val="dk1"/>
+            </a:fontRef>
+          </p:style>
+          <p:txBody>
+            <a:bodyPr wrap="none" lIns="60062" tIns="30031" rIns="60062" bIns="30031" rtlCol="0" anchor="ctr"/>
+            <a:lstStyle/>
+            <a:p>
+              <a:pPr algn="ctr"/>
+              <a:r>
+                <a:rPr lang="en-US" altLang="ja-JP" sz="1600" dirty="0">
+                  <a:latin typeface="源ノ角ゴシック Code JP R It" pitchFamily="34" charset="-128"/>
+                  <a:ea typeface="源ノ角ゴシック Code JP R It" pitchFamily="34" charset="-128"/>
+                </a:rPr>
+                <a:t>a</a:t>
+              </a:r>
+              <a:endParaRPr lang="ja-JP" altLang="en-US" sz="1600" dirty="0">
                 <a:latin typeface="源ノ角ゴシック Code JP R It" pitchFamily="34" charset="-128"/>
                 <a:ea typeface="源ノ角ゴシック Code JP R It" pitchFamily="34" charset="-128"/>
-              </a:rPr>
-              <a:t>a</a:t>
-            </a:r>
-            <a:endParaRPr lang="ja-JP" altLang="en-US" sz="2400" dirty="0">
-              <a:latin typeface="源ノ角ゴシック Code JP R It" pitchFamily="34" charset="-128"/>
-              <a:ea typeface="源ノ角ゴシック Code JP R It" pitchFamily="34" charset="-128"/>
-            </a:endParaRPr>
-          </a:p>
-        </p:txBody>
-      </p:sp>
-      <p:sp>
-        <p:nvSpPr>
-          <p:cNvPr id="46" name="円/楕円 45"/>
-          <p:cNvSpPr>
-            <a:spLocks noChangeAspect="1"/>
-          </p:cNvSpPr>
-          <p:nvPr/>
-        </p:nvSpPr>
-        <p:spPr>
-          <a:xfrm>
-            <a:off x="3720130" y="2164000"/>
-            <a:ext cx="477917" cy="478800"/>
-          </a:xfrm>
-          <a:prstGeom prst="ellipse">
-            <a:avLst/>
-          </a:prstGeom>
-        </p:spPr>
-        <p:style>
-          <a:lnRef idx="2">
-            <a:schemeClr val="accent3"/>
-          </a:lnRef>
-          <a:fillRef idx="1">
-            <a:schemeClr val="lt1"/>
-          </a:fillRef>
-          <a:effectRef idx="0">
-            <a:schemeClr val="accent3"/>
-          </a:effectRef>
-          <a:fontRef idx="minor">
-            <a:schemeClr val="dk1"/>
-          </a:fontRef>
-        </p:style>
-        <p:txBody>
-          <a:bodyPr wrap="none" lIns="60062" tIns="30031" rIns="60062" bIns="30031" rtlCol="0" anchor="ctr"/>
-          <a:lstStyle/>
-          <a:p>
-            <a:r>
-              <a:rPr lang="en-US" altLang="ja-JP" sz="2400" dirty="0">
+              </a:endParaRPr>
+            </a:p>
+          </p:txBody>
+        </p:sp>
+        <p:sp>
+          <p:nvSpPr>
+            <p:cNvPr id="75" name="円/楕円 74"/>
+            <p:cNvSpPr>
+              <a:spLocks noChangeAspect="1"/>
+            </p:cNvSpPr>
+            <p:nvPr/>
+          </p:nvSpPr>
+          <p:spPr>
+            <a:xfrm>
+              <a:off x="3720130" y="2164000"/>
+              <a:ext cx="477917" cy="478800"/>
+            </a:xfrm>
+            <a:prstGeom prst="ellipse">
+              <a:avLst/>
+            </a:prstGeom>
+          </p:spPr>
+          <p:style>
+            <a:lnRef idx="2">
+              <a:schemeClr val="accent3"/>
+            </a:lnRef>
+            <a:fillRef idx="1">
+              <a:schemeClr val="lt1"/>
+            </a:fillRef>
+            <a:effectRef idx="0">
+              <a:schemeClr val="accent3"/>
+            </a:effectRef>
+            <a:fontRef idx="minor">
+              <a:schemeClr val="dk1"/>
+            </a:fontRef>
+          </p:style>
+          <p:txBody>
+            <a:bodyPr wrap="none" lIns="60062" tIns="30031" rIns="60062" bIns="30031" rtlCol="0" anchor="ctr"/>
+            <a:lstStyle/>
+            <a:p>
+              <a:pPr algn="ctr"/>
+              <a:r>
+                <a:rPr lang="en-US" altLang="ja-JP" sz="1600" dirty="0">
+                  <a:latin typeface="源ノ角ゴシック Code JP R It" pitchFamily="34" charset="-128"/>
+                  <a:ea typeface="源ノ角ゴシック Code JP R It" pitchFamily="34" charset="-128"/>
+                </a:rPr>
+                <a:t>b</a:t>
+              </a:r>
+              <a:endParaRPr lang="ja-JP" altLang="en-US" sz="1600" dirty="0">
                 <a:latin typeface="源ノ角ゴシック Code JP R It" pitchFamily="34" charset="-128"/>
                 <a:ea typeface="源ノ角ゴシック Code JP R It" pitchFamily="34" charset="-128"/>
-              </a:rPr>
-              <a:t>b</a:t>
-            </a:r>
-            <a:endParaRPr lang="ja-JP" altLang="en-US" sz="2400" dirty="0">
-              <a:latin typeface="源ノ角ゴシック Code JP R It" pitchFamily="34" charset="-128"/>
-              <a:ea typeface="源ノ角ゴシック Code JP R It" pitchFamily="34" charset="-128"/>
-            </a:endParaRPr>
-          </a:p>
-        </p:txBody>
-      </p:sp>
-      <p:cxnSp>
-        <p:nvCxnSpPr>
-          <p:cNvPr id="49" name="直線コネクタ 48"/>
-          <p:cNvCxnSpPr>
-            <a:stCxn id="43" idx="3"/>
-            <a:endCxn id="44" idx="0"/>
-          </p:cNvCxnSpPr>
-          <p:nvPr/>
-        </p:nvCxnSpPr>
-        <p:spPr>
-          <a:xfrm flipH="1">
-            <a:off x="2999090" y="1743399"/>
-            <a:ext cx="311030" cy="420601"/>
-          </a:xfrm>
-          <a:prstGeom prst="line">
-            <a:avLst/>
-          </a:prstGeom>
-          <a:ln w="25400"/>
-        </p:spPr>
-        <p:style>
-          <a:lnRef idx="1">
-            <a:schemeClr val="accent3"/>
-          </a:lnRef>
-          <a:fillRef idx="0">
-            <a:schemeClr val="accent3"/>
-          </a:fillRef>
-          <a:effectRef idx="0">
-            <a:schemeClr val="accent3"/>
-          </a:effectRef>
-          <a:fontRef idx="minor">
-            <a:schemeClr val="tx1"/>
-          </a:fontRef>
-        </p:style>
-      </p:cxnSp>
-      <p:cxnSp>
-        <p:nvCxnSpPr>
-          <p:cNvPr id="50" name="直線コネクタ 49"/>
-          <p:cNvCxnSpPr>
-            <a:stCxn id="43" idx="5"/>
-            <a:endCxn id="46" idx="0"/>
-          </p:cNvCxnSpPr>
-          <p:nvPr/>
-        </p:nvCxnSpPr>
-        <p:spPr>
-          <a:xfrm>
-            <a:off x="3648059" y="1743399"/>
-            <a:ext cx="311030" cy="420601"/>
-          </a:xfrm>
-          <a:prstGeom prst="line">
-            <a:avLst/>
-          </a:prstGeom>
-          <a:ln w="25400"/>
-        </p:spPr>
-        <p:style>
-          <a:lnRef idx="1">
-            <a:schemeClr val="accent3"/>
-          </a:lnRef>
-          <a:fillRef idx="0">
-            <a:schemeClr val="accent3"/>
-          </a:fillRef>
-          <a:effectRef idx="0">
-            <a:schemeClr val="accent3"/>
-          </a:effectRef>
-          <a:fontRef idx="minor">
-            <a:schemeClr val="tx1"/>
-          </a:fontRef>
-        </p:style>
-      </p:cxnSp>
-      <p:sp>
-        <p:nvSpPr>
-          <p:cNvPr id="51" name="円/楕円 50"/>
-          <p:cNvSpPr>
-            <a:spLocks noChangeAspect="1"/>
-          </p:cNvSpPr>
-          <p:nvPr/>
-        </p:nvSpPr>
-        <p:spPr>
-          <a:xfrm>
-            <a:off x="4871938" y="1322444"/>
-            <a:ext cx="477917" cy="478800"/>
-          </a:xfrm>
-          <a:prstGeom prst="ellipse">
-            <a:avLst/>
-          </a:prstGeom>
-        </p:spPr>
-        <p:style>
-          <a:lnRef idx="2">
-            <a:schemeClr val="accent3"/>
-          </a:lnRef>
-          <a:fillRef idx="1">
-            <a:schemeClr val="lt1"/>
-          </a:fillRef>
-          <a:effectRef idx="0">
-            <a:schemeClr val="accent3"/>
-          </a:effectRef>
-          <a:fontRef idx="minor">
-            <a:schemeClr val="dk1"/>
-          </a:fontRef>
-        </p:style>
-        <p:txBody>
-          <a:bodyPr wrap="none" lIns="60062" tIns="30031" rIns="60062" bIns="30031" rtlCol="0" anchor="ctr"/>
-          <a:lstStyle/>
-          <a:p>
-            <a:r>
-              <a:rPr lang="en-US" altLang="ja-JP" sz="2400" dirty="0">
+              </a:endParaRPr>
+            </a:p>
+          </p:txBody>
+        </p:sp>
+        <p:cxnSp>
+          <p:nvCxnSpPr>
+            <p:cNvPr id="76" name="直線コネクタ 75"/>
+            <p:cNvCxnSpPr>
+              <a:stCxn id="73" idx="3"/>
+              <a:endCxn id="74" idx="0"/>
+            </p:cNvCxnSpPr>
+            <p:nvPr/>
+          </p:nvCxnSpPr>
+          <p:spPr>
+            <a:xfrm flipH="1">
+              <a:off x="2999090" y="1743399"/>
+              <a:ext cx="311030" cy="420601"/>
+            </a:xfrm>
+            <a:prstGeom prst="line">
+              <a:avLst/>
+            </a:prstGeom>
+            <a:ln w="25400"/>
+          </p:spPr>
+          <p:style>
+            <a:lnRef idx="1">
+              <a:schemeClr val="accent3"/>
+            </a:lnRef>
+            <a:fillRef idx="0">
+              <a:schemeClr val="accent3"/>
+            </a:fillRef>
+            <a:effectRef idx="0">
+              <a:schemeClr val="accent3"/>
+            </a:effectRef>
+            <a:fontRef idx="minor">
+              <a:schemeClr val="tx1"/>
+            </a:fontRef>
+          </p:style>
+        </p:cxnSp>
+        <p:cxnSp>
+          <p:nvCxnSpPr>
+            <p:cNvPr id="77" name="直線コネクタ 76"/>
+            <p:cNvCxnSpPr>
+              <a:stCxn id="73" idx="5"/>
+              <a:endCxn id="75" idx="0"/>
+            </p:cNvCxnSpPr>
+            <p:nvPr/>
+          </p:nvCxnSpPr>
+          <p:spPr>
+            <a:xfrm>
+              <a:off x="3648059" y="1743399"/>
+              <a:ext cx="311030" cy="420601"/>
+            </a:xfrm>
+            <a:prstGeom prst="line">
+              <a:avLst/>
+            </a:prstGeom>
+            <a:ln w="25400"/>
+          </p:spPr>
+          <p:style>
+            <a:lnRef idx="1">
+              <a:schemeClr val="accent3"/>
+            </a:lnRef>
+            <a:fillRef idx="0">
+              <a:schemeClr val="accent3"/>
+            </a:fillRef>
+            <a:effectRef idx="0">
+              <a:schemeClr val="accent3"/>
+            </a:effectRef>
+            <a:fontRef idx="minor">
+              <a:schemeClr val="tx1"/>
+            </a:fontRef>
+          </p:style>
+        </p:cxnSp>
+        <p:sp>
+          <p:nvSpPr>
+            <p:cNvPr id="78" name="円/楕円 77"/>
+            <p:cNvSpPr>
+              <a:spLocks noChangeAspect="1"/>
+            </p:cNvSpPr>
+            <p:nvPr/>
+          </p:nvSpPr>
+          <p:spPr>
+            <a:xfrm>
+              <a:off x="4871938" y="1322444"/>
+              <a:ext cx="477917" cy="478800"/>
+            </a:xfrm>
+            <a:prstGeom prst="ellipse">
+              <a:avLst/>
+            </a:prstGeom>
+          </p:spPr>
+          <p:style>
+            <a:lnRef idx="2">
+              <a:schemeClr val="accent3"/>
+            </a:lnRef>
+            <a:fillRef idx="1">
+              <a:schemeClr val="lt1"/>
+            </a:fillRef>
+            <a:effectRef idx="0">
+              <a:schemeClr val="accent3"/>
+            </a:effectRef>
+            <a:fontRef idx="minor">
+              <a:schemeClr val="dk1"/>
+            </a:fontRef>
+          </p:style>
+          <p:txBody>
+            <a:bodyPr wrap="none" lIns="60062" tIns="30031" rIns="60062" bIns="30031" rtlCol="0" anchor="ctr"/>
+            <a:lstStyle/>
+            <a:p>
+              <a:pPr algn="ctr"/>
+              <a:r>
+                <a:rPr lang="en-US" altLang="ja-JP" sz="1600" dirty="0" smtClean="0">
+                  <a:latin typeface="源ノ角ゴシック Code JP R It" pitchFamily="34" charset="-128"/>
+                  <a:ea typeface="源ノ角ゴシック Code JP R It" pitchFamily="34" charset="-128"/>
+                </a:rPr>
+                <a:t> s</a:t>
+              </a:r>
+              <a:r>
+                <a:rPr lang="en-US" altLang="ja-JP" sz="1600" dirty="0">
+                  <a:latin typeface="源ノ角ゴシック Code JP R It" pitchFamily="34" charset="-128"/>
+                  <a:ea typeface="源ノ角ゴシック Code JP R It" pitchFamily="34" charset="-128"/>
+                </a:rPr>
+                <a:t>'</a:t>
+              </a:r>
+              <a:endParaRPr lang="ja-JP" altLang="en-US" sz="1600" dirty="0">
                 <a:latin typeface="源ノ角ゴシック Code JP R It" pitchFamily="34" charset="-128"/>
                 <a:ea typeface="源ノ角ゴシック Code JP R It" pitchFamily="34" charset="-128"/>
-              </a:rPr>
-              <a:t>s'</a:t>
-            </a:r>
-            <a:endParaRPr lang="ja-JP" altLang="en-US" sz="2400" dirty="0">
-              <a:latin typeface="源ノ角ゴシック Code JP R It" pitchFamily="34" charset="-128"/>
-              <a:ea typeface="源ノ角ゴシック Code JP R It" pitchFamily="34" charset="-128"/>
-            </a:endParaRPr>
-          </a:p>
-        </p:txBody>
-      </p:sp>
-      <p:sp>
-        <p:nvSpPr>
-          <p:cNvPr id="52" name="円/楕円 51"/>
-          <p:cNvSpPr>
-            <a:spLocks noChangeAspect="1"/>
-          </p:cNvSpPr>
-          <p:nvPr/>
-        </p:nvSpPr>
-        <p:spPr>
-          <a:xfrm>
-            <a:off x="4391938" y="2164000"/>
-            <a:ext cx="477917" cy="478800"/>
-          </a:xfrm>
-          <a:prstGeom prst="ellipse">
-            <a:avLst/>
-          </a:prstGeom>
-        </p:spPr>
-        <p:style>
-          <a:lnRef idx="2">
-            <a:schemeClr val="accent3"/>
-          </a:lnRef>
-          <a:fillRef idx="1">
-            <a:schemeClr val="lt1"/>
-          </a:fillRef>
-          <a:effectRef idx="0">
-            <a:schemeClr val="accent3"/>
-          </a:effectRef>
-          <a:fontRef idx="minor">
-            <a:schemeClr val="dk1"/>
-          </a:fontRef>
-        </p:style>
-        <p:txBody>
-          <a:bodyPr wrap="none" lIns="60062" tIns="30031" rIns="60062" bIns="30031" rtlCol="0" anchor="ctr"/>
-          <a:lstStyle/>
-          <a:p>
-            <a:r>
-              <a:rPr lang="en-US" altLang="ja-JP" sz="2400" dirty="0">
+              </a:endParaRPr>
+            </a:p>
+          </p:txBody>
+        </p:sp>
+        <p:sp>
+          <p:nvSpPr>
+            <p:cNvPr id="79" name="円/楕円 78"/>
+            <p:cNvSpPr>
+              <a:spLocks noChangeAspect="1"/>
+            </p:cNvSpPr>
+            <p:nvPr/>
+          </p:nvSpPr>
+          <p:spPr>
+            <a:xfrm>
+              <a:off x="4391938" y="2164000"/>
+              <a:ext cx="477917" cy="478800"/>
+            </a:xfrm>
+            <a:prstGeom prst="ellipse">
+              <a:avLst/>
+            </a:prstGeom>
+          </p:spPr>
+          <p:style>
+            <a:lnRef idx="2">
+              <a:schemeClr val="accent3"/>
+            </a:lnRef>
+            <a:fillRef idx="1">
+              <a:schemeClr val="lt1"/>
+            </a:fillRef>
+            <a:effectRef idx="0">
+              <a:schemeClr val="accent3"/>
+            </a:effectRef>
+            <a:fontRef idx="minor">
+              <a:schemeClr val="dk1"/>
+            </a:fontRef>
+          </p:style>
+          <p:txBody>
+            <a:bodyPr wrap="none" lIns="60062" tIns="30031" rIns="60062" bIns="30031" rtlCol="0" anchor="ctr"/>
+            <a:lstStyle/>
+            <a:p>
+              <a:pPr algn="ctr"/>
+              <a:r>
+                <a:rPr lang="en-US" altLang="ja-JP" sz="1600" dirty="0">
+                  <a:latin typeface="源ノ角ゴシック Code JP R It" pitchFamily="34" charset="-128"/>
+                  <a:ea typeface="源ノ角ゴシック Code JP R It" pitchFamily="34" charset="-128"/>
+                </a:rPr>
+                <a:t>c</a:t>
+              </a:r>
+              <a:endParaRPr lang="ja-JP" altLang="en-US" sz="1600" dirty="0">
                 <a:latin typeface="源ノ角ゴシック Code JP R It" pitchFamily="34" charset="-128"/>
                 <a:ea typeface="源ノ角ゴシック Code JP R It" pitchFamily="34" charset="-128"/>
-              </a:rPr>
-              <a:t>c</a:t>
-            </a:r>
-            <a:endParaRPr lang="ja-JP" altLang="en-US" sz="2400" dirty="0">
-              <a:latin typeface="源ノ角ゴシック Code JP R It" pitchFamily="34" charset="-128"/>
-              <a:ea typeface="源ノ角ゴシック Code JP R It" pitchFamily="34" charset="-128"/>
-            </a:endParaRPr>
-          </a:p>
-        </p:txBody>
-      </p:sp>
-      <p:sp>
-        <p:nvSpPr>
-          <p:cNvPr id="53" name="円/楕円 52"/>
-          <p:cNvSpPr>
-            <a:spLocks noChangeAspect="1"/>
-          </p:cNvSpPr>
-          <p:nvPr/>
-        </p:nvSpPr>
-        <p:spPr>
-          <a:xfrm>
-            <a:off x="5351938" y="2164000"/>
-            <a:ext cx="477917" cy="478800"/>
-          </a:xfrm>
-          <a:prstGeom prst="ellipse">
-            <a:avLst/>
-          </a:prstGeom>
-        </p:spPr>
-        <p:style>
-          <a:lnRef idx="2">
-            <a:schemeClr val="accent3"/>
-          </a:lnRef>
-          <a:fillRef idx="1">
-            <a:schemeClr val="lt1"/>
-          </a:fillRef>
-          <a:effectRef idx="0">
-            <a:schemeClr val="accent3"/>
-          </a:effectRef>
-          <a:fontRef idx="minor">
-            <a:schemeClr val="dk1"/>
-          </a:fontRef>
-        </p:style>
-        <p:txBody>
-          <a:bodyPr wrap="none" lIns="60062" tIns="30031" rIns="60062" bIns="30031" rtlCol="0" anchor="ctr"/>
-          <a:lstStyle/>
-          <a:p>
-            <a:r>
-              <a:rPr lang="en-US" altLang="ja-JP" sz="2400" dirty="0">
+              </a:endParaRPr>
+            </a:p>
+          </p:txBody>
+        </p:sp>
+        <p:sp>
+          <p:nvSpPr>
+            <p:cNvPr id="80" name="円/楕円 79"/>
+            <p:cNvSpPr>
+              <a:spLocks noChangeAspect="1"/>
+            </p:cNvSpPr>
+            <p:nvPr/>
+          </p:nvSpPr>
+          <p:spPr>
+            <a:xfrm>
+              <a:off x="5351938" y="2164000"/>
+              <a:ext cx="477917" cy="478800"/>
+            </a:xfrm>
+            <a:prstGeom prst="ellipse">
+              <a:avLst/>
+            </a:prstGeom>
+          </p:spPr>
+          <p:style>
+            <a:lnRef idx="2">
+              <a:schemeClr val="accent3"/>
+            </a:lnRef>
+            <a:fillRef idx="1">
+              <a:schemeClr val="lt1"/>
+            </a:fillRef>
+            <a:effectRef idx="0">
+              <a:schemeClr val="accent3"/>
+            </a:effectRef>
+            <a:fontRef idx="minor">
+              <a:schemeClr val="dk1"/>
+            </a:fontRef>
+          </p:style>
+          <p:txBody>
+            <a:bodyPr wrap="none" lIns="60062" tIns="30031" rIns="60062" bIns="30031" rtlCol="0" anchor="ctr"/>
+            <a:lstStyle/>
+            <a:p>
+              <a:pPr algn="ctr"/>
+              <a:r>
+                <a:rPr lang="en-US" altLang="ja-JP" sz="1600" dirty="0">
+                  <a:latin typeface="源ノ角ゴシック Code JP R It" pitchFamily="34" charset="-128"/>
+                  <a:ea typeface="源ノ角ゴシック Code JP R It" pitchFamily="34" charset="-128"/>
+                </a:rPr>
+                <a:t>d</a:t>
+              </a:r>
+              <a:endParaRPr lang="ja-JP" altLang="en-US" sz="1600" dirty="0">
                 <a:latin typeface="源ノ角ゴシック Code JP R It" pitchFamily="34" charset="-128"/>
                 <a:ea typeface="源ノ角ゴシック Code JP R It" pitchFamily="34" charset="-128"/>
-              </a:rPr>
-              <a:t>d</a:t>
-            </a:r>
-            <a:endParaRPr lang="ja-JP" altLang="en-US" sz="2400" dirty="0">
-              <a:latin typeface="源ノ角ゴシック Code JP R It" pitchFamily="34" charset="-128"/>
-              <a:ea typeface="源ノ角ゴシック Code JP R It" pitchFamily="34" charset="-128"/>
-            </a:endParaRPr>
-          </a:p>
-        </p:txBody>
-      </p:sp>
-      <p:cxnSp>
-        <p:nvCxnSpPr>
-          <p:cNvPr id="54" name="直線コネクタ 53"/>
-          <p:cNvCxnSpPr>
-            <a:stCxn id="51" idx="3"/>
-            <a:endCxn id="52" idx="0"/>
-          </p:cNvCxnSpPr>
-          <p:nvPr/>
-        </p:nvCxnSpPr>
-        <p:spPr>
-          <a:xfrm flipH="1">
-            <a:off x="4630897" y="1731125"/>
-            <a:ext cx="311030" cy="432875"/>
-          </a:xfrm>
-          <a:prstGeom prst="line">
-            <a:avLst/>
-          </a:prstGeom>
-          <a:ln w="25400"/>
-        </p:spPr>
-        <p:style>
-          <a:lnRef idx="1">
-            <a:schemeClr val="accent3"/>
-          </a:lnRef>
-          <a:fillRef idx="0">
-            <a:schemeClr val="accent3"/>
-          </a:fillRef>
-          <a:effectRef idx="0">
-            <a:schemeClr val="accent3"/>
-          </a:effectRef>
-          <a:fontRef idx="minor">
-            <a:schemeClr val="tx1"/>
-          </a:fontRef>
-        </p:style>
-      </p:cxnSp>
-      <p:cxnSp>
-        <p:nvCxnSpPr>
-          <p:cNvPr id="55" name="直線コネクタ 54"/>
-          <p:cNvCxnSpPr>
-            <a:stCxn id="51" idx="5"/>
-            <a:endCxn id="53" idx="0"/>
-          </p:cNvCxnSpPr>
-          <p:nvPr/>
-        </p:nvCxnSpPr>
-        <p:spPr>
-          <a:xfrm>
-            <a:off x="5279866" y="1731125"/>
-            <a:ext cx="311031" cy="432875"/>
-          </a:xfrm>
-          <a:prstGeom prst="line">
-            <a:avLst/>
-          </a:prstGeom>
-          <a:ln w="25400"/>
-        </p:spPr>
-        <p:style>
-          <a:lnRef idx="1">
-            <a:schemeClr val="accent3"/>
-          </a:lnRef>
-          <a:fillRef idx="0">
-            <a:schemeClr val="accent3"/>
-          </a:fillRef>
-          <a:effectRef idx="0">
-            <a:schemeClr val="accent3"/>
-          </a:effectRef>
-          <a:fontRef idx="minor">
-            <a:schemeClr val="tx1"/>
-          </a:fontRef>
-        </p:style>
-      </p:cxnSp>
-      <p:sp>
-        <p:nvSpPr>
-          <p:cNvPr id="88" name="右矢印 87"/>
-          <p:cNvSpPr/>
-          <p:nvPr/>
-        </p:nvSpPr>
-        <p:spPr>
-          <a:xfrm>
-            <a:off x="2397319" y="1322444"/>
-            <a:ext cx="480000" cy="480888"/>
-          </a:xfrm>
-          <a:prstGeom prst="rightArrow">
-            <a:avLst>
-              <a:gd name="adj1" fmla="val 50000"/>
-              <a:gd name="adj2" fmla="val 50000"/>
-            </a:avLst>
-          </a:prstGeom>
-        </p:spPr>
-        <p:style>
-          <a:lnRef idx="2">
-            <a:schemeClr val="accent3">
-              <a:shade val="50000"/>
-            </a:schemeClr>
-          </a:lnRef>
-          <a:fillRef idx="1">
-            <a:schemeClr val="accent3"/>
-          </a:fillRef>
-          <a:effectRef idx="0">
-            <a:schemeClr val="accent3"/>
-          </a:effectRef>
-          <a:fontRef idx="minor">
-            <a:schemeClr val="lt1"/>
-          </a:fontRef>
-        </p:style>
-        <p:txBody>
-          <a:bodyPr lIns="60062" tIns="30031" rIns="60062" bIns="30031" rtlCol="0" anchor="ctr"/>
-          <a:lstStyle/>
-          <a:p>
-            <a:endParaRPr kumimoji="1" lang="ja-JP" altLang="en-US"/>
-          </a:p>
-        </p:txBody>
-      </p:sp>
+              </a:endParaRPr>
+            </a:p>
+          </p:txBody>
+        </p:sp>
+        <p:cxnSp>
+          <p:nvCxnSpPr>
+            <p:cNvPr id="81" name="直線コネクタ 80"/>
+            <p:cNvCxnSpPr>
+              <a:stCxn id="78" idx="3"/>
+              <a:endCxn id="79" idx="0"/>
+            </p:cNvCxnSpPr>
+            <p:nvPr/>
+          </p:nvCxnSpPr>
+          <p:spPr>
+            <a:xfrm flipH="1">
+              <a:off x="4630897" y="1731125"/>
+              <a:ext cx="311030" cy="432875"/>
+            </a:xfrm>
+            <a:prstGeom prst="line">
+              <a:avLst/>
+            </a:prstGeom>
+            <a:ln w="25400"/>
+          </p:spPr>
+          <p:style>
+            <a:lnRef idx="1">
+              <a:schemeClr val="accent3"/>
+            </a:lnRef>
+            <a:fillRef idx="0">
+              <a:schemeClr val="accent3"/>
+            </a:fillRef>
+            <a:effectRef idx="0">
+              <a:schemeClr val="accent3"/>
+            </a:effectRef>
+            <a:fontRef idx="minor">
+              <a:schemeClr val="tx1"/>
+            </a:fontRef>
+          </p:style>
+        </p:cxnSp>
+        <p:cxnSp>
+          <p:nvCxnSpPr>
+            <p:cNvPr id="82" name="直線コネクタ 81"/>
+            <p:cNvCxnSpPr>
+              <a:stCxn id="78" idx="5"/>
+              <a:endCxn id="80" idx="0"/>
+            </p:cNvCxnSpPr>
+            <p:nvPr/>
+          </p:nvCxnSpPr>
+          <p:spPr>
+            <a:xfrm>
+              <a:off x="5279866" y="1731125"/>
+              <a:ext cx="311031" cy="432875"/>
+            </a:xfrm>
+            <a:prstGeom prst="line">
+              <a:avLst/>
+            </a:prstGeom>
+            <a:ln w="25400"/>
+          </p:spPr>
+          <p:style>
+            <a:lnRef idx="1">
+              <a:schemeClr val="accent3"/>
+            </a:lnRef>
+            <a:fillRef idx="0">
+              <a:schemeClr val="accent3"/>
+            </a:fillRef>
+            <a:effectRef idx="0">
+              <a:schemeClr val="accent3"/>
+            </a:effectRef>
+            <a:fontRef idx="minor">
+              <a:schemeClr val="tx1"/>
+            </a:fontRef>
+          </p:style>
+        </p:cxnSp>
+        <p:sp>
+          <p:nvSpPr>
+            <p:cNvPr id="83" name="右矢印 82"/>
+            <p:cNvSpPr/>
+            <p:nvPr/>
+          </p:nvSpPr>
+          <p:spPr>
+            <a:xfrm>
+              <a:off x="2397319" y="1322444"/>
+              <a:ext cx="480000" cy="480888"/>
+            </a:xfrm>
+            <a:prstGeom prst="rightArrow">
+              <a:avLst>
+                <a:gd name="adj1" fmla="val 50000"/>
+                <a:gd name="adj2" fmla="val 50000"/>
+              </a:avLst>
+            </a:prstGeom>
+          </p:spPr>
+          <p:style>
+            <a:lnRef idx="2">
+              <a:schemeClr val="accent3">
+                <a:shade val="50000"/>
+              </a:schemeClr>
+            </a:lnRef>
+            <a:fillRef idx="1">
+              <a:schemeClr val="accent3"/>
+            </a:fillRef>
+            <a:effectRef idx="0">
+              <a:schemeClr val="accent3"/>
+            </a:effectRef>
+            <a:fontRef idx="minor">
+              <a:schemeClr val="lt1"/>
+            </a:fontRef>
+          </p:style>
+          <p:txBody>
+            <a:bodyPr lIns="60062" tIns="30031" rIns="60062" bIns="30031" rtlCol="0" anchor="ctr"/>
+            <a:lstStyle/>
+            <a:p>
+              <a:pPr algn="ctr"/>
+              <a:endParaRPr kumimoji="1" lang="ja-JP" altLang="en-US" sz="1600">
+                <a:latin typeface="源ノ角ゴシック Code JP R It" pitchFamily="34" charset="-128"/>
+                <a:ea typeface="源ノ角ゴシック Code JP R It" pitchFamily="34" charset="-128"/>
+              </a:endParaRPr>
+            </a:p>
+          </p:txBody>
+        </p:sp>
+      </p:grpSp>
     </p:spTree>
     <p:extLst>
       <p:ext uri="{BB962C8B-B14F-4D97-AF65-F5344CB8AC3E}">

</xml_diff>